<commit_message>
our ideas & results
</commit_message>
<xml_diff>
--- a/results/final_Project 0616.pptx
+++ b/results/final_Project 0616.pptx
@@ -21,8 +21,9 @@
     <p:sldId id="273" r:id="rId15"/>
     <p:sldId id="290" r:id="rId16"/>
     <p:sldId id="291" r:id="rId17"/>
-    <p:sldId id="293" r:id="rId18"/>
-    <p:sldId id="272" r:id="rId19"/>
+    <p:sldId id="295" r:id="rId18"/>
+    <p:sldId id="293" r:id="rId19"/>
+    <p:sldId id="272" r:id="rId20"/>
   </p:sldIdLst>
   <p:sldSz cx="12192000" cy="6858000"/>
   <p:notesSz cx="6858000" cy="9144000"/>
@@ -151,7 +152,7 @@
           <p:cNvPr id="2" name="標題 1">
             <a:extLst>
               <a:ext uri="{FF2B5EF4-FFF2-40B4-BE49-F238E27FC236}">
-                <a16:creationId xmlns:a16="http://schemas.microsoft.com/office/drawing/2014/main" xmlns="" id="{375C55FB-13DA-475F-89F1-586B5300FDA6}"/>
+                <a16:creationId xmlns="" xmlns:a16="http://schemas.microsoft.com/office/drawing/2014/main" id="{375C55FB-13DA-475F-89F1-586B5300FDA6}"/>
               </a:ext>
             </a:extLst>
           </p:cNvPr>
@@ -188,7 +189,7 @@
           <p:cNvPr id="3" name="副標題 2">
             <a:extLst>
               <a:ext uri="{FF2B5EF4-FFF2-40B4-BE49-F238E27FC236}">
-                <a16:creationId xmlns:a16="http://schemas.microsoft.com/office/drawing/2014/main" xmlns="" id="{10AD27D3-1940-4508-8126-AAD9CF8511FE}"/>
+                <a16:creationId xmlns="" xmlns:a16="http://schemas.microsoft.com/office/drawing/2014/main" id="{10AD27D3-1940-4508-8126-AAD9CF8511FE}"/>
               </a:ext>
             </a:extLst>
           </p:cNvPr>
@@ -258,7 +259,7 @@
           <p:cNvPr id="4" name="日期版面配置區 3">
             <a:extLst>
               <a:ext uri="{FF2B5EF4-FFF2-40B4-BE49-F238E27FC236}">
-                <a16:creationId xmlns:a16="http://schemas.microsoft.com/office/drawing/2014/main" xmlns="" id="{5AEF5EB0-91E1-419C-94B8-87417A05E82C}"/>
+                <a16:creationId xmlns="" xmlns:a16="http://schemas.microsoft.com/office/drawing/2014/main" id="{5AEF5EB0-91E1-419C-94B8-87417A05E82C}"/>
               </a:ext>
             </a:extLst>
           </p:cNvPr>
@@ -276,7 +277,7 @@
           <a:p>
             <a:fld id="{2420A41E-FCCD-4E27-BA06-382B62526C19}" type="datetimeFigureOut">
               <a:rPr lang="zh-TW" altLang="en-US" smtClean="0"/>
-              <a:t>2022/6/15</a:t>
+              <a:t>2022/6/16</a:t>
             </a:fld>
             <a:endParaRPr lang="zh-TW" altLang="en-US"/>
           </a:p>
@@ -287,7 +288,7 @@
           <p:cNvPr id="5" name="頁尾版面配置區 4">
             <a:extLst>
               <a:ext uri="{FF2B5EF4-FFF2-40B4-BE49-F238E27FC236}">
-                <a16:creationId xmlns:a16="http://schemas.microsoft.com/office/drawing/2014/main" xmlns="" id="{F1554EC3-6C53-450D-BBCE-EDA2996B1220}"/>
+                <a16:creationId xmlns="" xmlns:a16="http://schemas.microsoft.com/office/drawing/2014/main" id="{F1554EC3-6C53-450D-BBCE-EDA2996B1220}"/>
               </a:ext>
             </a:extLst>
           </p:cNvPr>
@@ -312,7 +313,7 @@
           <p:cNvPr id="6" name="投影片編號版面配置區 5">
             <a:extLst>
               <a:ext uri="{FF2B5EF4-FFF2-40B4-BE49-F238E27FC236}">
-                <a16:creationId xmlns:a16="http://schemas.microsoft.com/office/drawing/2014/main" xmlns="" id="{35F9D51C-F487-496D-92A6-AC5A88958A6E}"/>
+                <a16:creationId xmlns="" xmlns:a16="http://schemas.microsoft.com/office/drawing/2014/main" id="{35F9D51C-F487-496D-92A6-AC5A88958A6E}"/>
               </a:ext>
             </a:extLst>
           </p:cNvPr>
@@ -371,7 +372,7 @@
           <p:cNvPr id="2" name="標題 1">
             <a:extLst>
               <a:ext uri="{FF2B5EF4-FFF2-40B4-BE49-F238E27FC236}">
-                <a16:creationId xmlns:a16="http://schemas.microsoft.com/office/drawing/2014/main" xmlns="" id="{E8B75E9B-6B01-4531-A76F-F26BC7418C48}"/>
+                <a16:creationId xmlns="" xmlns:a16="http://schemas.microsoft.com/office/drawing/2014/main" id="{E8B75E9B-6B01-4531-A76F-F26BC7418C48}"/>
               </a:ext>
             </a:extLst>
           </p:cNvPr>
@@ -399,7 +400,7 @@
           <p:cNvPr id="3" name="直排文字版面配置區 2">
             <a:extLst>
               <a:ext uri="{FF2B5EF4-FFF2-40B4-BE49-F238E27FC236}">
-                <a16:creationId xmlns:a16="http://schemas.microsoft.com/office/drawing/2014/main" xmlns="" id="{4C67C1EB-99C4-4BD4-A32A-B1E939E82462}"/>
+                <a16:creationId xmlns="" xmlns:a16="http://schemas.microsoft.com/office/drawing/2014/main" id="{4C67C1EB-99C4-4BD4-A32A-B1E939E82462}"/>
               </a:ext>
             </a:extLst>
           </p:cNvPr>
@@ -456,7 +457,7 @@
           <p:cNvPr id="4" name="日期版面配置區 3">
             <a:extLst>
               <a:ext uri="{FF2B5EF4-FFF2-40B4-BE49-F238E27FC236}">
-                <a16:creationId xmlns:a16="http://schemas.microsoft.com/office/drawing/2014/main" xmlns="" id="{76896EE3-0100-4229-9CF3-EEFFABFFAB86}"/>
+                <a16:creationId xmlns="" xmlns:a16="http://schemas.microsoft.com/office/drawing/2014/main" id="{76896EE3-0100-4229-9CF3-EEFFABFFAB86}"/>
               </a:ext>
             </a:extLst>
           </p:cNvPr>
@@ -474,7 +475,7 @@
           <a:p>
             <a:fld id="{2420A41E-FCCD-4E27-BA06-382B62526C19}" type="datetimeFigureOut">
               <a:rPr lang="zh-TW" altLang="en-US" smtClean="0"/>
-              <a:t>2022/6/15</a:t>
+              <a:t>2022/6/16</a:t>
             </a:fld>
             <a:endParaRPr lang="zh-TW" altLang="en-US"/>
           </a:p>
@@ -485,7 +486,7 @@
           <p:cNvPr id="5" name="頁尾版面配置區 4">
             <a:extLst>
               <a:ext uri="{FF2B5EF4-FFF2-40B4-BE49-F238E27FC236}">
-                <a16:creationId xmlns:a16="http://schemas.microsoft.com/office/drawing/2014/main" xmlns="" id="{A2300858-0FA7-497A-A3D7-AAE406D9F2FF}"/>
+                <a16:creationId xmlns="" xmlns:a16="http://schemas.microsoft.com/office/drawing/2014/main" id="{A2300858-0FA7-497A-A3D7-AAE406D9F2FF}"/>
               </a:ext>
             </a:extLst>
           </p:cNvPr>
@@ -510,7 +511,7 @@
           <p:cNvPr id="6" name="投影片編號版面配置區 5">
             <a:extLst>
               <a:ext uri="{FF2B5EF4-FFF2-40B4-BE49-F238E27FC236}">
-                <a16:creationId xmlns:a16="http://schemas.microsoft.com/office/drawing/2014/main" xmlns="" id="{C4900871-805F-41E3-AF5D-29829BB80C52}"/>
+                <a16:creationId xmlns="" xmlns:a16="http://schemas.microsoft.com/office/drawing/2014/main" id="{C4900871-805F-41E3-AF5D-29829BB80C52}"/>
               </a:ext>
             </a:extLst>
           </p:cNvPr>
@@ -569,7 +570,7 @@
           <p:cNvPr id="2" name="直排標題 1">
             <a:extLst>
               <a:ext uri="{FF2B5EF4-FFF2-40B4-BE49-F238E27FC236}">
-                <a16:creationId xmlns:a16="http://schemas.microsoft.com/office/drawing/2014/main" xmlns="" id="{F0365C75-12A0-4D1E-93E9-7259FEFEA59B}"/>
+                <a16:creationId xmlns="" xmlns:a16="http://schemas.microsoft.com/office/drawing/2014/main" id="{F0365C75-12A0-4D1E-93E9-7259FEFEA59B}"/>
               </a:ext>
             </a:extLst>
           </p:cNvPr>
@@ -602,7 +603,7 @@
           <p:cNvPr id="3" name="直排文字版面配置區 2">
             <a:extLst>
               <a:ext uri="{FF2B5EF4-FFF2-40B4-BE49-F238E27FC236}">
-                <a16:creationId xmlns:a16="http://schemas.microsoft.com/office/drawing/2014/main" xmlns="" id="{C857AD3A-C441-4586-89F0-FED09F50AE0B}"/>
+                <a16:creationId xmlns="" xmlns:a16="http://schemas.microsoft.com/office/drawing/2014/main" id="{C857AD3A-C441-4586-89F0-FED09F50AE0B}"/>
               </a:ext>
             </a:extLst>
           </p:cNvPr>
@@ -664,7 +665,7 @@
           <p:cNvPr id="4" name="日期版面配置區 3">
             <a:extLst>
               <a:ext uri="{FF2B5EF4-FFF2-40B4-BE49-F238E27FC236}">
-                <a16:creationId xmlns:a16="http://schemas.microsoft.com/office/drawing/2014/main" xmlns="" id="{1C6E5A14-2F46-4883-94EA-4B93A779DA13}"/>
+                <a16:creationId xmlns="" xmlns:a16="http://schemas.microsoft.com/office/drawing/2014/main" id="{1C6E5A14-2F46-4883-94EA-4B93A779DA13}"/>
               </a:ext>
             </a:extLst>
           </p:cNvPr>
@@ -682,7 +683,7 @@
           <a:p>
             <a:fld id="{2420A41E-FCCD-4E27-BA06-382B62526C19}" type="datetimeFigureOut">
               <a:rPr lang="zh-TW" altLang="en-US" smtClean="0"/>
-              <a:t>2022/6/15</a:t>
+              <a:t>2022/6/16</a:t>
             </a:fld>
             <a:endParaRPr lang="zh-TW" altLang="en-US"/>
           </a:p>
@@ -693,7 +694,7 @@
           <p:cNvPr id="5" name="頁尾版面配置區 4">
             <a:extLst>
               <a:ext uri="{FF2B5EF4-FFF2-40B4-BE49-F238E27FC236}">
-                <a16:creationId xmlns:a16="http://schemas.microsoft.com/office/drawing/2014/main" xmlns="" id="{8CD5EE52-53BE-4B46-A9E8-AF8DDD4D9CF5}"/>
+                <a16:creationId xmlns="" xmlns:a16="http://schemas.microsoft.com/office/drawing/2014/main" id="{8CD5EE52-53BE-4B46-A9E8-AF8DDD4D9CF5}"/>
               </a:ext>
             </a:extLst>
           </p:cNvPr>
@@ -718,7 +719,7 @@
           <p:cNvPr id="6" name="投影片編號版面配置區 5">
             <a:extLst>
               <a:ext uri="{FF2B5EF4-FFF2-40B4-BE49-F238E27FC236}">
-                <a16:creationId xmlns:a16="http://schemas.microsoft.com/office/drawing/2014/main" xmlns="" id="{EF942D1D-8649-4699-B8B2-DE1B5962D115}"/>
+                <a16:creationId xmlns="" xmlns:a16="http://schemas.microsoft.com/office/drawing/2014/main" id="{EF942D1D-8649-4699-B8B2-DE1B5962D115}"/>
               </a:ext>
             </a:extLst>
           </p:cNvPr>
@@ -777,7 +778,7 @@
           <p:cNvPr id="2" name="標題 1">
             <a:extLst>
               <a:ext uri="{FF2B5EF4-FFF2-40B4-BE49-F238E27FC236}">
-                <a16:creationId xmlns:a16="http://schemas.microsoft.com/office/drawing/2014/main" xmlns="" id="{34F9802B-500B-4BBA-AB64-4DEFA34C9A1A}"/>
+                <a16:creationId xmlns="" xmlns:a16="http://schemas.microsoft.com/office/drawing/2014/main" id="{34F9802B-500B-4BBA-AB64-4DEFA34C9A1A}"/>
               </a:ext>
             </a:extLst>
           </p:cNvPr>
@@ -805,7 +806,7 @@
           <p:cNvPr id="3" name="內容版面配置區 2">
             <a:extLst>
               <a:ext uri="{FF2B5EF4-FFF2-40B4-BE49-F238E27FC236}">
-                <a16:creationId xmlns:a16="http://schemas.microsoft.com/office/drawing/2014/main" xmlns="" id="{CA8AC1E3-7D06-4749-9BDD-0A8568B24B7B}"/>
+                <a16:creationId xmlns="" xmlns:a16="http://schemas.microsoft.com/office/drawing/2014/main" id="{CA8AC1E3-7D06-4749-9BDD-0A8568B24B7B}"/>
               </a:ext>
             </a:extLst>
           </p:cNvPr>
@@ -862,7 +863,7 @@
           <p:cNvPr id="4" name="日期版面配置區 3">
             <a:extLst>
               <a:ext uri="{FF2B5EF4-FFF2-40B4-BE49-F238E27FC236}">
-                <a16:creationId xmlns:a16="http://schemas.microsoft.com/office/drawing/2014/main" xmlns="" id="{DB9DF8DC-9DF2-4D26-A5C6-EF9980736678}"/>
+                <a16:creationId xmlns="" xmlns:a16="http://schemas.microsoft.com/office/drawing/2014/main" id="{DB9DF8DC-9DF2-4D26-A5C6-EF9980736678}"/>
               </a:ext>
             </a:extLst>
           </p:cNvPr>
@@ -880,7 +881,7 @@
           <a:p>
             <a:fld id="{2420A41E-FCCD-4E27-BA06-382B62526C19}" type="datetimeFigureOut">
               <a:rPr lang="zh-TW" altLang="en-US" smtClean="0"/>
-              <a:t>2022/6/15</a:t>
+              <a:t>2022/6/16</a:t>
             </a:fld>
             <a:endParaRPr lang="zh-TW" altLang="en-US"/>
           </a:p>
@@ -891,7 +892,7 @@
           <p:cNvPr id="5" name="頁尾版面配置區 4">
             <a:extLst>
               <a:ext uri="{FF2B5EF4-FFF2-40B4-BE49-F238E27FC236}">
-                <a16:creationId xmlns:a16="http://schemas.microsoft.com/office/drawing/2014/main" xmlns="" id="{D5ECAC3B-B000-414E-9D78-2929C9CE3984}"/>
+                <a16:creationId xmlns="" xmlns:a16="http://schemas.microsoft.com/office/drawing/2014/main" id="{D5ECAC3B-B000-414E-9D78-2929C9CE3984}"/>
               </a:ext>
             </a:extLst>
           </p:cNvPr>
@@ -916,7 +917,7 @@
           <p:cNvPr id="6" name="投影片編號版面配置區 5">
             <a:extLst>
               <a:ext uri="{FF2B5EF4-FFF2-40B4-BE49-F238E27FC236}">
-                <a16:creationId xmlns:a16="http://schemas.microsoft.com/office/drawing/2014/main" xmlns="" id="{D13648CC-126D-4D3E-969B-965C99302E29}"/>
+                <a16:creationId xmlns="" xmlns:a16="http://schemas.microsoft.com/office/drawing/2014/main" id="{D13648CC-126D-4D3E-969B-965C99302E29}"/>
               </a:ext>
             </a:extLst>
           </p:cNvPr>
@@ -975,7 +976,7 @@
           <p:cNvPr id="2" name="標題 1">
             <a:extLst>
               <a:ext uri="{FF2B5EF4-FFF2-40B4-BE49-F238E27FC236}">
-                <a16:creationId xmlns:a16="http://schemas.microsoft.com/office/drawing/2014/main" xmlns="" id="{006137B9-6664-4975-8052-47EE07B836C9}"/>
+                <a16:creationId xmlns="" xmlns:a16="http://schemas.microsoft.com/office/drawing/2014/main" id="{006137B9-6664-4975-8052-47EE07B836C9}"/>
               </a:ext>
             </a:extLst>
           </p:cNvPr>
@@ -1012,7 +1013,7 @@
           <p:cNvPr id="3" name="文字版面配置區 2">
             <a:extLst>
               <a:ext uri="{FF2B5EF4-FFF2-40B4-BE49-F238E27FC236}">
-                <a16:creationId xmlns:a16="http://schemas.microsoft.com/office/drawing/2014/main" xmlns="" id="{613C22B3-19E9-4547-ADC9-9D7059608CEE}"/>
+                <a16:creationId xmlns="" xmlns:a16="http://schemas.microsoft.com/office/drawing/2014/main" id="{613C22B3-19E9-4547-ADC9-9D7059608CEE}"/>
               </a:ext>
             </a:extLst>
           </p:cNvPr>
@@ -1137,7 +1138,7 @@
           <p:cNvPr id="4" name="日期版面配置區 3">
             <a:extLst>
               <a:ext uri="{FF2B5EF4-FFF2-40B4-BE49-F238E27FC236}">
-                <a16:creationId xmlns:a16="http://schemas.microsoft.com/office/drawing/2014/main" xmlns="" id="{897D15E9-DFAD-4C98-9216-FEE86982D7DE}"/>
+                <a16:creationId xmlns="" xmlns:a16="http://schemas.microsoft.com/office/drawing/2014/main" id="{897D15E9-DFAD-4C98-9216-FEE86982D7DE}"/>
               </a:ext>
             </a:extLst>
           </p:cNvPr>
@@ -1155,7 +1156,7 @@
           <a:p>
             <a:fld id="{2420A41E-FCCD-4E27-BA06-382B62526C19}" type="datetimeFigureOut">
               <a:rPr lang="zh-TW" altLang="en-US" smtClean="0"/>
-              <a:t>2022/6/15</a:t>
+              <a:t>2022/6/16</a:t>
             </a:fld>
             <a:endParaRPr lang="zh-TW" altLang="en-US"/>
           </a:p>
@@ -1166,7 +1167,7 @@
           <p:cNvPr id="5" name="頁尾版面配置區 4">
             <a:extLst>
               <a:ext uri="{FF2B5EF4-FFF2-40B4-BE49-F238E27FC236}">
-                <a16:creationId xmlns:a16="http://schemas.microsoft.com/office/drawing/2014/main" xmlns="" id="{31C0B7F6-1157-4603-BDD7-8E317BB16A03}"/>
+                <a16:creationId xmlns="" xmlns:a16="http://schemas.microsoft.com/office/drawing/2014/main" id="{31C0B7F6-1157-4603-BDD7-8E317BB16A03}"/>
               </a:ext>
             </a:extLst>
           </p:cNvPr>
@@ -1191,7 +1192,7 @@
           <p:cNvPr id="6" name="投影片編號版面配置區 5">
             <a:extLst>
               <a:ext uri="{FF2B5EF4-FFF2-40B4-BE49-F238E27FC236}">
-                <a16:creationId xmlns:a16="http://schemas.microsoft.com/office/drawing/2014/main" xmlns="" id="{44900532-D667-4F81-8379-8AA6629BC953}"/>
+                <a16:creationId xmlns="" xmlns:a16="http://schemas.microsoft.com/office/drawing/2014/main" id="{44900532-D667-4F81-8379-8AA6629BC953}"/>
               </a:ext>
             </a:extLst>
           </p:cNvPr>
@@ -1250,7 +1251,7 @@
           <p:cNvPr id="2" name="標題 1">
             <a:extLst>
               <a:ext uri="{FF2B5EF4-FFF2-40B4-BE49-F238E27FC236}">
-                <a16:creationId xmlns:a16="http://schemas.microsoft.com/office/drawing/2014/main" xmlns="" id="{22944AA8-C828-4815-9C88-855D090CF88B}"/>
+                <a16:creationId xmlns="" xmlns:a16="http://schemas.microsoft.com/office/drawing/2014/main" id="{22944AA8-C828-4815-9C88-855D090CF88B}"/>
               </a:ext>
             </a:extLst>
           </p:cNvPr>
@@ -1278,7 +1279,7 @@
           <p:cNvPr id="3" name="內容版面配置區 2">
             <a:extLst>
               <a:ext uri="{FF2B5EF4-FFF2-40B4-BE49-F238E27FC236}">
-                <a16:creationId xmlns:a16="http://schemas.microsoft.com/office/drawing/2014/main" xmlns="" id="{71A6F59E-948D-4C0B-A438-1EBF1FD86075}"/>
+                <a16:creationId xmlns="" xmlns:a16="http://schemas.microsoft.com/office/drawing/2014/main" id="{71A6F59E-948D-4C0B-A438-1EBF1FD86075}"/>
               </a:ext>
             </a:extLst>
           </p:cNvPr>
@@ -1340,7 +1341,7 @@
           <p:cNvPr id="4" name="內容版面配置區 3">
             <a:extLst>
               <a:ext uri="{FF2B5EF4-FFF2-40B4-BE49-F238E27FC236}">
-                <a16:creationId xmlns:a16="http://schemas.microsoft.com/office/drawing/2014/main" xmlns="" id="{1C6D047A-04DD-4919-BC8B-34D069E9901A}"/>
+                <a16:creationId xmlns="" xmlns:a16="http://schemas.microsoft.com/office/drawing/2014/main" id="{1C6D047A-04DD-4919-BC8B-34D069E9901A}"/>
               </a:ext>
             </a:extLst>
           </p:cNvPr>
@@ -1402,7 +1403,7 @@
           <p:cNvPr id="5" name="日期版面配置區 4">
             <a:extLst>
               <a:ext uri="{FF2B5EF4-FFF2-40B4-BE49-F238E27FC236}">
-                <a16:creationId xmlns:a16="http://schemas.microsoft.com/office/drawing/2014/main" xmlns="" id="{04B9158F-6C0F-4589-9CBB-A5D4CDB64D88}"/>
+                <a16:creationId xmlns="" xmlns:a16="http://schemas.microsoft.com/office/drawing/2014/main" id="{04B9158F-6C0F-4589-9CBB-A5D4CDB64D88}"/>
               </a:ext>
             </a:extLst>
           </p:cNvPr>
@@ -1420,7 +1421,7 @@
           <a:p>
             <a:fld id="{2420A41E-FCCD-4E27-BA06-382B62526C19}" type="datetimeFigureOut">
               <a:rPr lang="zh-TW" altLang="en-US" smtClean="0"/>
-              <a:t>2022/6/15</a:t>
+              <a:t>2022/6/16</a:t>
             </a:fld>
             <a:endParaRPr lang="zh-TW" altLang="en-US"/>
           </a:p>
@@ -1431,7 +1432,7 @@
           <p:cNvPr id="6" name="頁尾版面配置區 5">
             <a:extLst>
               <a:ext uri="{FF2B5EF4-FFF2-40B4-BE49-F238E27FC236}">
-                <a16:creationId xmlns:a16="http://schemas.microsoft.com/office/drawing/2014/main" xmlns="" id="{8CA10E2D-8817-4E63-B771-FAF994169A00}"/>
+                <a16:creationId xmlns="" xmlns:a16="http://schemas.microsoft.com/office/drawing/2014/main" id="{8CA10E2D-8817-4E63-B771-FAF994169A00}"/>
               </a:ext>
             </a:extLst>
           </p:cNvPr>
@@ -1456,7 +1457,7 @@
           <p:cNvPr id="7" name="投影片編號版面配置區 6">
             <a:extLst>
               <a:ext uri="{FF2B5EF4-FFF2-40B4-BE49-F238E27FC236}">
-                <a16:creationId xmlns:a16="http://schemas.microsoft.com/office/drawing/2014/main" xmlns="" id="{A5EBBAF7-987A-4F3A-A56C-F7D513D29225}"/>
+                <a16:creationId xmlns="" xmlns:a16="http://schemas.microsoft.com/office/drawing/2014/main" id="{A5EBBAF7-987A-4F3A-A56C-F7D513D29225}"/>
               </a:ext>
             </a:extLst>
           </p:cNvPr>
@@ -1515,7 +1516,7 @@
           <p:cNvPr id="2" name="標題 1">
             <a:extLst>
               <a:ext uri="{FF2B5EF4-FFF2-40B4-BE49-F238E27FC236}">
-                <a16:creationId xmlns:a16="http://schemas.microsoft.com/office/drawing/2014/main" xmlns="" id="{9F38D1ED-F8F7-489D-9BC6-FA280CFCE673}"/>
+                <a16:creationId xmlns="" xmlns:a16="http://schemas.microsoft.com/office/drawing/2014/main" id="{9F38D1ED-F8F7-489D-9BC6-FA280CFCE673}"/>
               </a:ext>
             </a:extLst>
           </p:cNvPr>
@@ -1548,7 +1549,7 @@
           <p:cNvPr id="3" name="文字版面配置區 2">
             <a:extLst>
               <a:ext uri="{FF2B5EF4-FFF2-40B4-BE49-F238E27FC236}">
-                <a16:creationId xmlns:a16="http://schemas.microsoft.com/office/drawing/2014/main" xmlns="" id="{137AE34F-1ADE-4C19-9A5C-A3EAFEE9F968}"/>
+                <a16:creationId xmlns="" xmlns:a16="http://schemas.microsoft.com/office/drawing/2014/main" id="{137AE34F-1ADE-4C19-9A5C-A3EAFEE9F968}"/>
               </a:ext>
             </a:extLst>
           </p:cNvPr>
@@ -1619,7 +1620,7 @@
           <p:cNvPr id="4" name="內容版面配置區 3">
             <a:extLst>
               <a:ext uri="{FF2B5EF4-FFF2-40B4-BE49-F238E27FC236}">
-                <a16:creationId xmlns:a16="http://schemas.microsoft.com/office/drawing/2014/main" xmlns="" id="{CF7D039A-2AD6-49DB-95D5-E4391CEF169C}"/>
+                <a16:creationId xmlns="" xmlns:a16="http://schemas.microsoft.com/office/drawing/2014/main" id="{CF7D039A-2AD6-49DB-95D5-E4391CEF169C}"/>
               </a:ext>
             </a:extLst>
           </p:cNvPr>
@@ -1681,7 +1682,7 @@
           <p:cNvPr id="5" name="文字版面配置區 4">
             <a:extLst>
               <a:ext uri="{FF2B5EF4-FFF2-40B4-BE49-F238E27FC236}">
-                <a16:creationId xmlns:a16="http://schemas.microsoft.com/office/drawing/2014/main" xmlns="" id="{3EF97230-3B96-443B-941E-EB4C1B8BAD38}"/>
+                <a16:creationId xmlns="" xmlns:a16="http://schemas.microsoft.com/office/drawing/2014/main" id="{3EF97230-3B96-443B-941E-EB4C1B8BAD38}"/>
               </a:ext>
             </a:extLst>
           </p:cNvPr>
@@ -1752,7 +1753,7 @@
           <p:cNvPr id="6" name="內容版面配置區 5">
             <a:extLst>
               <a:ext uri="{FF2B5EF4-FFF2-40B4-BE49-F238E27FC236}">
-                <a16:creationId xmlns:a16="http://schemas.microsoft.com/office/drawing/2014/main" xmlns="" id="{EBDCD45C-733A-4A89-8FA2-C8753AE2B0F8}"/>
+                <a16:creationId xmlns="" xmlns:a16="http://schemas.microsoft.com/office/drawing/2014/main" id="{EBDCD45C-733A-4A89-8FA2-C8753AE2B0F8}"/>
               </a:ext>
             </a:extLst>
           </p:cNvPr>
@@ -1814,7 +1815,7 @@
           <p:cNvPr id="7" name="日期版面配置區 6">
             <a:extLst>
               <a:ext uri="{FF2B5EF4-FFF2-40B4-BE49-F238E27FC236}">
-                <a16:creationId xmlns:a16="http://schemas.microsoft.com/office/drawing/2014/main" xmlns="" id="{0D88B4B6-5ACF-464E-A7DB-4929A7D97FA2}"/>
+                <a16:creationId xmlns="" xmlns:a16="http://schemas.microsoft.com/office/drawing/2014/main" id="{0D88B4B6-5ACF-464E-A7DB-4929A7D97FA2}"/>
               </a:ext>
             </a:extLst>
           </p:cNvPr>
@@ -1832,7 +1833,7 @@
           <a:p>
             <a:fld id="{2420A41E-FCCD-4E27-BA06-382B62526C19}" type="datetimeFigureOut">
               <a:rPr lang="zh-TW" altLang="en-US" smtClean="0"/>
-              <a:t>2022/6/15</a:t>
+              <a:t>2022/6/16</a:t>
             </a:fld>
             <a:endParaRPr lang="zh-TW" altLang="en-US"/>
           </a:p>
@@ -1843,7 +1844,7 @@
           <p:cNvPr id="8" name="頁尾版面配置區 7">
             <a:extLst>
               <a:ext uri="{FF2B5EF4-FFF2-40B4-BE49-F238E27FC236}">
-                <a16:creationId xmlns:a16="http://schemas.microsoft.com/office/drawing/2014/main" xmlns="" id="{75125118-FC93-427F-B4ED-6DDEA366F855}"/>
+                <a16:creationId xmlns="" xmlns:a16="http://schemas.microsoft.com/office/drawing/2014/main" id="{75125118-FC93-427F-B4ED-6DDEA366F855}"/>
               </a:ext>
             </a:extLst>
           </p:cNvPr>
@@ -1868,7 +1869,7 @@
           <p:cNvPr id="9" name="投影片編號版面配置區 8">
             <a:extLst>
               <a:ext uri="{FF2B5EF4-FFF2-40B4-BE49-F238E27FC236}">
-                <a16:creationId xmlns:a16="http://schemas.microsoft.com/office/drawing/2014/main" xmlns="" id="{2FC72B8B-10F9-4963-9EC3-D4782736F5A9}"/>
+                <a16:creationId xmlns="" xmlns:a16="http://schemas.microsoft.com/office/drawing/2014/main" id="{2FC72B8B-10F9-4963-9EC3-D4782736F5A9}"/>
               </a:ext>
             </a:extLst>
           </p:cNvPr>
@@ -1927,7 +1928,7 @@
           <p:cNvPr id="2" name="標題 1">
             <a:extLst>
               <a:ext uri="{FF2B5EF4-FFF2-40B4-BE49-F238E27FC236}">
-                <a16:creationId xmlns:a16="http://schemas.microsoft.com/office/drawing/2014/main" xmlns="" id="{7FD7C9AF-D5B6-4F38-917C-FBC787541D82}"/>
+                <a16:creationId xmlns="" xmlns:a16="http://schemas.microsoft.com/office/drawing/2014/main" id="{7FD7C9AF-D5B6-4F38-917C-FBC787541D82}"/>
               </a:ext>
             </a:extLst>
           </p:cNvPr>
@@ -1955,7 +1956,7 @@
           <p:cNvPr id="3" name="日期版面配置區 2">
             <a:extLst>
               <a:ext uri="{FF2B5EF4-FFF2-40B4-BE49-F238E27FC236}">
-                <a16:creationId xmlns:a16="http://schemas.microsoft.com/office/drawing/2014/main" xmlns="" id="{B6A80D2D-4FF7-4585-87B5-C5374BAF1B36}"/>
+                <a16:creationId xmlns="" xmlns:a16="http://schemas.microsoft.com/office/drawing/2014/main" id="{B6A80D2D-4FF7-4585-87B5-C5374BAF1B36}"/>
               </a:ext>
             </a:extLst>
           </p:cNvPr>
@@ -1973,7 +1974,7 @@
           <a:p>
             <a:fld id="{2420A41E-FCCD-4E27-BA06-382B62526C19}" type="datetimeFigureOut">
               <a:rPr lang="zh-TW" altLang="en-US" smtClean="0"/>
-              <a:t>2022/6/15</a:t>
+              <a:t>2022/6/16</a:t>
             </a:fld>
             <a:endParaRPr lang="zh-TW" altLang="en-US"/>
           </a:p>
@@ -1984,7 +1985,7 @@
           <p:cNvPr id="4" name="頁尾版面配置區 3">
             <a:extLst>
               <a:ext uri="{FF2B5EF4-FFF2-40B4-BE49-F238E27FC236}">
-                <a16:creationId xmlns:a16="http://schemas.microsoft.com/office/drawing/2014/main" xmlns="" id="{430D5AC1-7CBD-4EAF-9CAB-EB683379F05C}"/>
+                <a16:creationId xmlns="" xmlns:a16="http://schemas.microsoft.com/office/drawing/2014/main" id="{430D5AC1-7CBD-4EAF-9CAB-EB683379F05C}"/>
               </a:ext>
             </a:extLst>
           </p:cNvPr>
@@ -2009,7 +2010,7 @@
           <p:cNvPr id="5" name="投影片編號版面配置區 4">
             <a:extLst>
               <a:ext uri="{FF2B5EF4-FFF2-40B4-BE49-F238E27FC236}">
-                <a16:creationId xmlns:a16="http://schemas.microsoft.com/office/drawing/2014/main" xmlns="" id="{4709CB59-C46B-43A5-A46A-15DC2B5F71EC}"/>
+                <a16:creationId xmlns="" xmlns:a16="http://schemas.microsoft.com/office/drawing/2014/main" id="{4709CB59-C46B-43A5-A46A-15DC2B5F71EC}"/>
               </a:ext>
             </a:extLst>
           </p:cNvPr>
@@ -2068,7 +2069,7 @@
           <p:cNvPr id="2" name="日期版面配置區 1">
             <a:extLst>
               <a:ext uri="{FF2B5EF4-FFF2-40B4-BE49-F238E27FC236}">
-                <a16:creationId xmlns:a16="http://schemas.microsoft.com/office/drawing/2014/main" xmlns="" id="{17E01F9C-8E5F-46D3-A4EA-21B9FB00B7D2}"/>
+                <a16:creationId xmlns="" xmlns:a16="http://schemas.microsoft.com/office/drawing/2014/main" id="{17E01F9C-8E5F-46D3-A4EA-21B9FB00B7D2}"/>
               </a:ext>
             </a:extLst>
           </p:cNvPr>
@@ -2086,7 +2087,7 @@
           <a:p>
             <a:fld id="{2420A41E-FCCD-4E27-BA06-382B62526C19}" type="datetimeFigureOut">
               <a:rPr lang="zh-TW" altLang="en-US" smtClean="0"/>
-              <a:t>2022/6/15</a:t>
+              <a:t>2022/6/16</a:t>
             </a:fld>
             <a:endParaRPr lang="zh-TW" altLang="en-US"/>
           </a:p>
@@ -2097,7 +2098,7 @@
           <p:cNvPr id="3" name="頁尾版面配置區 2">
             <a:extLst>
               <a:ext uri="{FF2B5EF4-FFF2-40B4-BE49-F238E27FC236}">
-                <a16:creationId xmlns:a16="http://schemas.microsoft.com/office/drawing/2014/main" xmlns="" id="{5D27A066-61AC-4DE8-BE37-1A95FB354561}"/>
+                <a16:creationId xmlns="" xmlns:a16="http://schemas.microsoft.com/office/drawing/2014/main" id="{5D27A066-61AC-4DE8-BE37-1A95FB354561}"/>
               </a:ext>
             </a:extLst>
           </p:cNvPr>
@@ -2122,7 +2123,7 @@
           <p:cNvPr id="4" name="投影片編號版面配置區 3">
             <a:extLst>
               <a:ext uri="{FF2B5EF4-FFF2-40B4-BE49-F238E27FC236}">
-                <a16:creationId xmlns:a16="http://schemas.microsoft.com/office/drawing/2014/main" xmlns="" id="{1971DBC5-12BA-4497-86E4-EB8D85AE42A4}"/>
+                <a16:creationId xmlns="" xmlns:a16="http://schemas.microsoft.com/office/drawing/2014/main" id="{1971DBC5-12BA-4497-86E4-EB8D85AE42A4}"/>
               </a:ext>
             </a:extLst>
           </p:cNvPr>
@@ -2181,7 +2182,7 @@
           <p:cNvPr id="2" name="標題 1">
             <a:extLst>
               <a:ext uri="{FF2B5EF4-FFF2-40B4-BE49-F238E27FC236}">
-                <a16:creationId xmlns:a16="http://schemas.microsoft.com/office/drawing/2014/main" xmlns="" id="{89759501-E4FC-452C-A1DD-DCF90793464A}"/>
+                <a16:creationId xmlns="" xmlns:a16="http://schemas.microsoft.com/office/drawing/2014/main" id="{89759501-E4FC-452C-A1DD-DCF90793464A}"/>
               </a:ext>
             </a:extLst>
           </p:cNvPr>
@@ -2218,7 +2219,7 @@
           <p:cNvPr id="3" name="內容版面配置區 2">
             <a:extLst>
               <a:ext uri="{FF2B5EF4-FFF2-40B4-BE49-F238E27FC236}">
-                <a16:creationId xmlns:a16="http://schemas.microsoft.com/office/drawing/2014/main" xmlns="" id="{2407BBC4-B816-4E7A-9BC7-B1A2B420369C}"/>
+                <a16:creationId xmlns="" xmlns:a16="http://schemas.microsoft.com/office/drawing/2014/main" id="{2407BBC4-B816-4E7A-9BC7-B1A2B420369C}"/>
               </a:ext>
             </a:extLst>
           </p:cNvPr>
@@ -2308,7 +2309,7 @@
           <p:cNvPr id="4" name="文字版面配置區 3">
             <a:extLst>
               <a:ext uri="{FF2B5EF4-FFF2-40B4-BE49-F238E27FC236}">
-                <a16:creationId xmlns:a16="http://schemas.microsoft.com/office/drawing/2014/main" xmlns="" id="{501BAFFB-C7A9-4AFF-9692-E541AB7D0DA5}"/>
+                <a16:creationId xmlns="" xmlns:a16="http://schemas.microsoft.com/office/drawing/2014/main" id="{501BAFFB-C7A9-4AFF-9692-E541AB7D0DA5}"/>
               </a:ext>
             </a:extLst>
           </p:cNvPr>
@@ -2379,7 +2380,7 @@
           <p:cNvPr id="5" name="日期版面配置區 4">
             <a:extLst>
               <a:ext uri="{FF2B5EF4-FFF2-40B4-BE49-F238E27FC236}">
-                <a16:creationId xmlns:a16="http://schemas.microsoft.com/office/drawing/2014/main" xmlns="" id="{6924CA1E-B21E-4CC9-9900-AAF619FA89D3}"/>
+                <a16:creationId xmlns="" xmlns:a16="http://schemas.microsoft.com/office/drawing/2014/main" id="{6924CA1E-B21E-4CC9-9900-AAF619FA89D3}"/>
               </a:ext>
             </a:extLst>
           </p:cNvPr>
@@ -2397,7 +2398,7 @@
           <a:p>
             <a:fld id="{2420A41E-FCCD-4E27-BA06-382B62526C19}" type="datetimeFigureOut">
               <a:rPr lang="zh-TW" altLang="en-US" smtClean="0"/>
-              <a:t>2022/6/15</a:t>
+              <a:t>2022/6/16</a:t>
             </a:fld>
             <a:endParaRPr lang="zh-TW" altLang="en-US"/>
           </a:p>
@@ -2408,7 +2409,7 @@
           <p:cNvPr id="6" name="頁尾版面配置區 5">
             <a:extLst>
               <a:ext uri="{FF2B5EF4-FFF2-40B4-BE49-F238E27FC236}">
-                <a16:creationId xmlns:a16="http://schemas.microsoft.com/office/drawing/2014/main" xmlns="" id="{47E2CEF1-9F7A-4364-8D42-041FA4281C03}"/>
+                <a16:creationId xmlns="" xmlns:a16="http://schemas.microsoft.com/office/drawing/2014/main" id="{47E2CEF1-9F7A-4364-8D42-041FA4281C03}"/>
               </a:ext>
             </a:extLst>
           </p:cNvPr>
@@ -2433,7 +2434,7 @@
           <p:cNvPr id="7" name="投影片編號版面配置區 6">
             <a:extLst>
               <a:ext uri="{FF2B5EF4-FFF2-40B4-BE49-F238E27FC236}">
-                <a16:creationId xmlns:a16="http://schemas.microsoft.com/office/drawing/2014/main" xmlns="" id="{11172547-307E-4495-8570-0166537F0BD4}"/>
+                <a16:creationId xmlns="" xmlns:a16="http://schemas.microsoft.com/office/drawing/2014/main" id="{11172547-307E-4495-8570-0166537F0BD4}"/>
               </a:ext>
             </a:extLst>
           </p:cNvPr>
@@ -2492,7 +2493,7 @@
           <p:cNvPr id="2" name="標題 1">
             <a:extLst>
               <a:ext uri="{FF2B5EF4-FFF2-40B4-BE49-F238E27FC236}">
-                <a16:creationId xmlns:a16="http://schemas.microsoft.com/office/drawing/2014/main" xmlns="" id="{A7786EC8-111E-441E-93B3-398A4E9302AF}"/>
+                <a16:creationId xmlns="" xmlns:a16="http://schemas.microsoft.com/office/drawing/2014/main" id="{A7786EC8-111E-441E-93B3-398A4E9302AF}"/>
               </a:ext>
             </a:extLst>
           </p:cNvPr>
@@ -2529,7 +2530,7 @@
           <p:cNvPr id="3" name="圖片版面配置區 2">
             <a:extLst>
               <a:ext uri="{FF2B5EF4-FFF2-40B4-BE49-F238E27FC236}">
-                <a16:creationId xmlns:a16="http://schemas.microsoft.com/office/drawing/2014/main" xmlns="" id="{9DC8207A-A878-4C18-B6CA-50F7289297C1}"/>
+                <a16:creationId xmlns="" xmlns:a16="http://schemas.microsoft.com/office/drawing/2014/main" id="{9DC8207A-A878-4C18-B6CA-50F7289297C1}"/>
               </a:ext>
             </a:extLst>
           </p:cNvPr>
@@ -2596,7 +2597,7 @@
           <p:cNvPr id="4" name="文字版面配置區 3">
             <a:extLst>
               <a:ext uri="{FF2B5EF4-FFF2-40B4-BE49-F238E27FC236}">
-                <a16:creationId xmlns:a16="http://schemas.microsoft.com/office/drawing/2014/main" xmlns="" id="{5E60C3D6-27FE-4254-9AB0-FBE71A1F20C7}"/>
+                <a16:creationId xmlns="" xmlns:a16="http://schemas.microsoft.com/office/drawing/2014/main" id="{5E60C3D6-27FE-4254-9AB0-FBE71A1F20C7}"/>
               </a:ext>
             </a:extLst>
           </p:cNvPr>
@@ -2667,7 +2668,7 @@
           <p:cNvPr id="5" name="日期版面配置區 4">
             <a:extLst>
               <a:ext uri="{FF2B5EF4-FFF2-40B4-BE49-F238E27FC236}">
-                <a16:creationId xmlns:a16="http://schemas.microsoft.com/office/drawing/2014/main" xmlns="" id="{7C2A6F29-847E-4D0D-A85E-F5989D18FC37}"/>
+                <a16:creationId xmlns="" xmlns:a16="http://schemas.microsoft.com/office/drawing/2014/main" id="{7C2A6F29-847E-4D0D-A85E-F5989D18FC37}"/>
               </a:ext>
             </a:extLst>
           </p:cNvPr>
@@ -2685,7 +2686,7 @@
           <a:p>
             <a:fld id="{2420A41E-FCCD-4E27-BA06-382B62526C19}" type="datetimeFigureOut">
               <a:rPr lang="zh-TW" altLang="en-US" smtClean="0"/>
-              <a:t>2022/6/15</a:t>
+              <a:t>2022/6/16</a:t>
             </a:fld>
             <a:endParaRPr lang="zh-TW" altLang="en-US"/>
           </a:p>
@@ -2696,7 +2697,7 @@
           <p:cNvPr id="6" name="頁尾版面配置區 5">
             <a:extLst>
               <a:ext uri="{FF2B5EF4-FFF2-40B4-BE49-F238E27FC236}">
-                <a16:creationId xmlns:a16="http://schemas.microsoft.com/office/drawing/2014/main" xmlns="" id="{BFD8D5B4-F819-4A56-B4FF-6CA8E78E0C92}"/>
+                <a16:creationId xmlns="" xmlns:a16="http://schemas.microsoft.com/office/drawing/2014/main" id="{BFD8D5B4-F819-4A56-B4FF-6CA8E78E0C92}"/>
               </a:ext>
             </a:extLst>
           </p:cNvPr>
@@ -2721,7 +2722,7 @@
           <p:cNvPr id="7" name="投影片編號版面配置區 6">
             <a:extLst>
               <a:ext uri="{FF2B5EF4-FFF2-40B4-BE49-F238E27FC236}">
-                <a16:creationId xmlns:a16="http://schemas.microsoft.com/office/drawing/2014/main" xmlns="" id="{E8F9BAED-39D4-48FE-89E0-CA5B6E84223F}"/>
+                <a16:creationId xmlns="" xmlns:a16="http://schemas.microsoft.com/office/drawing/2014/main" id="{E8F9BAED-39D4-48FE-89E0-CA5B6E84223F}"/>
               </a:ext>
             </a:extLst>
           </p:cNvPr>
@@ -2785,7 +2786,7 @@
           <p:cNvPr id="2" name="標題版面配置區 1">
             <a:extLst>
               <a:ext uri="{FF2B5EF4-FFF2-40B4-BE49-F238E27FC236}">
-                <a16:creationId xmlns:a16="http://schemas.microsoft.com/office/drawing/2014/main" xmlns="" id="{6A4B2C18-44BA-44F1-AD48-6B8BC082602B}"/>
+                <a16:creationId xmlns="" xmlns:a16="http://schemas.microsoft.com/office/drawing/2014/main" id="{6A4B2C18-44BA-44F1-AD48-6B8BC082602B}"/>
               </a:ext>
             </a:extLst>
           </p:cNvPr>
@@ -2823,7 +2824,7 @@
           <p:cNvPr id="3" name="文字版面配置區 2">
             <a:extLst>
               <a:ext uri="{FF2B5EF4-FFF2-40B4-BE49-F238E27FC236}">
-                <a16:creationId xmlns:a16="http://schemas.microsoft.com/office/drawing/2014/main" xmlns="" id="{357802B3-08C4-40F8-9374-9795E570599D}"/>
+                <a16:creationId xmlns="" xmlns:a16="http://schemas.microsoft.com/office/drawing/2014/main" id="{357802B3-08C4-40F8-9374-9795E570599D}"/>
               </a:ext>
             </a:extLst>
           </p:cNvPr>
@@ -2890,7 +2891,7 @@
           <p:cNvPr id="4" name="日期版面配置區 3">
             <a:extLst>
               <a:ext uri="{FF2B5EF4-FFF2-40B4-BE49-F238E27FC236}">
-                <a16:creationId xmlns:a16="http://schemas.microsoft.com/office/drawing/2014/main" xmlns="" id="{1F481F9B-30C5-42A8-9579-D528BBBD842E}"/>
+                <a16:creationId xmlns="" xmlns:a16="http://schemas.microsoft.com/office/drawing/2014/main" id="{1F481F9B-30C5-42A8-9579-D528BBBD842E}"/>
               </a:ext>
             </a:extLst>
           </p:cNvPr>
@@ -2926,7 +2927,7 @@
           <a:p>
             <a:fld id="{2420A41E-FCCD-4E27-BA06-382B62526C19}" type="datetimeFigureOut">
               <a:rPr lang="zh-TW" altLang="en-US" smtClean="0"/>
-              <a:t>2022/6/15</a:t>
+              <a:t>2022/6/16</a:t>
             </a:fld>
             <a:endParaRPr lang="zh-TW" altLang="en-US"/>
           </a:p>
@@ -2937,7 +2938,7 @@
           <p:cNvPr id="5" name="頁尾版面配置區 4">
             <a:extLst>
               <a:ext uri="{FF2B5EF4-FFF2-40B4-BE49-F238E27FC236}">
-                <a16:creationId xmlns:a16="http://schemas.microsoft.com/office/drawing/2014/main" xmlns="" id="{51F25DC0-C125-4088-910C-B7DCD6D0BF34}"/>
+                <a16:creationId xmlns="" xmlns:a16="http://schemas.microsoft.com/office/drawing/2014/main" id="{51F25DC0-C125-4088-910C-B7DCD6D0BF34}"/>
               </a:ext>
             </a:extLst>
           </p:cNvPr>
@@ -2980,7 +2981,7 @@
           <p:cNvPr id="6" name="投影片編號版面配置區 5">
             <a:extLst>
               <a:ext uri="{FF2B5EF4-FFF2-40B4-BE49-F238E27FC236}">
-                <a16:creationId xmlns:a16="http://schemas.microsoft.com/office/drawing/2014/main" xmlns="" id="{C0A0A40F-D3E0-428F-A004-65263EBACDD8}"/>
+                <a16:creationId xmlns="" xmlns:a16="http://schemas.microsoft.com/office/drawing/2014/main" id="{C0A0A40F-D3E0-428F-A004-65263EBACDD8}"/>
               </a:ext>
             </a:extLst>
           </p:cNvPr>
@@ -3362,7 +3363,7 @@
             <p:cNvPr id="3" name="圖片 2" descr="一張含有 地圖 的圖片&#10;&#10;自動產生的描述">
               <a:extLst>
                 <a:ext uri="{FF2B5EF4-FFF2-40B4-BE49-F238E27FC236}">
-                  <a16:creationId xmlns:a16="http://schemas.microsoft.com/office/drawing/2014/main" xmlns="" id="{1845A2B8-2EAD-4E96-8AE0-13C9FFFED708}"/>
+                  <a16:creationId xmlns="" xmlns:a16="http://schemas.microsoft.com/office/drawing/2014/main" id="{1845A2B8-2EAD-4E96-8AE0-13C9FFFED708}"/>
                 </a:ext>
               </a:extLst>
             </p:cNvPr>
@@ -3447,7 +3448,7 @@
           <p:cNvPr id="4" name="Rectangle 19">
             <a:extLst>
               <a:ext uri="{FF2B5EF4-FFF2-40B4-BE49-F238E27FC236}">
-                <a16:creationId xmlns:a16="http://schemas.microsoft.com/office/drawing/2014/main" xmlns="" id="{A8DAC473-E61D-4FED-A709-AD99250BAC50}"/>
+                <a16:creationId xmlns="" xmlns:a16="http://schemas.microsoft.com/office/drawing/2014/main" id="{A8DAC473-E61D-4FED-A709-AD99250BAC50}"/>
               </a:ext>
             </a:extLst>
           </p:cNvPr>
@@ -3561,7 +3562,7 @@
           <p:cNvPr id="5" name="Rectangle 19">
             <a:extLst>
               <a:ext uri="{FF2B5EF4-FFF2-40B4-BE49-F238E27FC236}">
-                <a16:creationId xmlns:a16="http://schemas.microsoft.com/office/drawing/2014/main" xmlns="" id="{A8DAC473-E61D-4FED-A709-AD99250BAC50}"/>
+                <a16:creationId xmlns="" xmlns:a16="http://schemas.microsoft.com/office/drawing/2014/main" id="{A8DAC473-E61D-4FED-A709-AD99250BAC50}"/>
               </a:ext>
             </a:extLst>
           </p:cNvPr>
@@ -3642,7 +3643,7 @@
           <p:cNvPr id="7" name="Rectangle 19">
             <a:extLst>
               <a:ext uri="{FF2B5EF4-FFF2-40B4-BE49-F238E27FC236}">
-                <a16:creationId xmlns:a16="http://schemas.microsoft.com/office/drawing/2014/main" xmlns="" id="{A8DAC473-E61D-4FED-A709-AD99250BAC50}"/>
+                <a16:creationId xmlns="" xmlns:a16="http://schemas.microsoft.com/office/drawing/2014/main" id="{A8DAC473-E61D-4FED-A709-AD99250BAC50}"/>
               </a:ext>
             </a:extLst>
           </p:cNvPr>
@@ -4425,7 +4426,7 @@
           <p:cNvPr id="7" name="Rectangle 19">
             <a:extLst>
               <a:ext uri="{FF2B5EF4-FFF2-40B4-BE49-F238E27FC236}">
-                <a16:creationId xmlns:a16="http://schemas.microsoft.com/office/drawing/2014/main" xmlns="" id="{0364B90F-DC6A-447C-9B45-4BC7335B0D8E}"/>
+                <a16:creationId xmlns="" xmlns:a16="http://schemas.microsoft.com/office/drawing/2014/main" id="{0364B90F-DC6A-447C-9B45-4BC7335B0D8E}"/>
               </a:ext>
             </a:extLst>
           </p:cNvPr>
@@ -4505,7 +4506,7 @@
           <p:cNvPr id="8" name="Rectangle 19">
             <a:extLst>
               <a:ext uri="{FF2B5EF4-FFF2-40B4-BE49-F238E27FC236}">
-                <a16:creationId xmlns:a16="http://schemas.microsoft.com/office/drawing/2014/main" xmlns="" id="{0364B90F-DC6A-447C-9B45-4BC7335B0D8E}"/>
+                <a16:creationId xmlns="" xmlns:a16="http://schemas.microsoft.com/office/drawing/2014/main" id="{0364B90F-DC6A-447C-9B45-4BC7335B0D8E}"/>
               </a:ext>
             </a:extLst>
           </p:cNvPr>
@@ -4642,7 +4643,7 @@
           <p:cNvPr id="10" name="Rectangle 19">
             <a:extLst>
               <a:ext uri="{FF2B5EF4-FFF2-40B4-BE49-F238E27FC236}">
-                <a16:creationId xmlns:a16="http://schemas.microsoft.com/office/drawing/2014/main" xmlns="" id="{0364B90F-DC6A-447C-9B45-4BC7335B0D8E}"/>
+                <a16:creationId xmlns="" xmlns:a16="http://schemas.microsoft.com/office/drawing/2014/main" id="{0364B90F-DC6A-447C-9B45-4BC7335B0D8E}"/>
               </a:ext>
             </a:extLst>
           </p:cNvPr>
@@ -4760,7 +4761,7 @@
           <p:cNvPr id="4" name="標題 1">
             <a:extLst>
               <a:ext uri="{FF2B5EF4-FFF2-40B4-BE49-F238E27FC236}">
-                <a16:creationId xmlns:a16="http://schemas.microsoft.com/office/drawing/2014/main" xmlns="" id="{1E9F1537-65E4-A3BC-E1BA-1059EBA75A80}"/>
+                <a16:creationId xmlns="" xmlns:a16="http://schemas.microsoft.com/office/drawing/2014/main" id="{1E9F1537-65E4-A3BC-E1BA-1059EBA75A80}"/>
               </a:ext>
             </a:extLst>
           </p:cNvPr>
@@ -4912,13 +4913,6 @@
               </a:rPr>
               <a:t>caret</a:t>
             </a:r>
-            <a:endParaRPr lang="en-US" altLang="zh-TW" sz="2800" dirty="0" smtClean="0">
-              <a:solidFill>
-                <a:srgbClr val="00B0F0"/>
-              </a:solidFill>
-              <a:latin typeface="微軟正黑體" panose="020B0604030504040204" pitchFamily="34" charset="-120"/>
-              <a:ea typeface="微軟正黑體" panose="020B0604030504040204" pitchFamily="34" charset="-120"/>
-            </a:endParaRPr>
           </a:p>
           <a:p>
             <a:r>
@@ -5069,7 +5063,7 @@
           <p:cNvPr id="4" name="標題 1">
             <a:extLst>
               <a:ext uri="{FF2B5EF4-FFF2-40B4-BE49-F238E27FC236}">
-                <a16:creationId xmlns:a16="http://schemas.microsoft.com/office/drawing/2014/main" xmlns="" id="{1E9F1537-65E4-A3BC-E1BA-1059EBA75A80}"/>
+                <a16:creationId xmlns="" xmlns:a16="http://schemas.microsoft.com/office/drawing/2014/main" id="{1E9F1537-65E4-A3BC-E1BA-1059EBA75A80}"/>
               </a:ext>
             </a:extLst>
           </p:cNvPr>
@@ -5114,19 +5108,7 @@
                 <a:latin typeface="微軟正黑體" panose="020B0604030504040204" pitchFamily="34" charset="-120"/>
                 <a:ea typeface="微軟正黑體" panose="020B0604030504040204" pitchFamily="34" charset="-120"/>
               </a:rPr>
-              <a:t>f</a:t>
-            </a:r>
-            <a:r>
-              <a:rPr lang="en-US" altLang="zh-TW" sz="4000" b="1" dirty="0" err="1" smtClean="0">
-                <a:solidFill>
-                  <a:schemeClr val="bg2">
-                    <a:lumMod val="50000"/>
-                  </a:schemeClr>
-                </a:solidFill>
-                <a:latin typeface="微軟正黑體" panose="020B0604030504040204" pitchFamily="34" charset="-120"/>
-                <a:ea typeface="微軟正黑體" panose="020B0604030504040204" pitchFamily="34" charset="-120"/>
-              </a:rPr>
-              <a:t>easures</a:t>
+              <a:t>feasures</a:t>
             </a:r>
             <a:r>
               <a:rPr lang="en-US" altLang="zh-TW" sz="4000" b="1" dirty="0" smtClean="0">
@@ -5348,13 +5330,6 @@
               </a:rPr>
               <a:t>.</a:t>
             </a:r>
-            <a:endParaRPr lang="en-US" altLang="zh-TW" sz="3200" dirty="0" smtClean="0">
-              <a:solidFill>
-                <a:srgbClr val="002060"/>
-              </a:solidFill>
-              <a:latin typeface="微軟正黑體" panose="020B0604030504040204" pitchFamily="34" charset="-120"/>
-              <a:ea typeface="微軟正黑體" panose="020B0604030504040204" pitchFamily="34" charset="-120"/>
-            </a:endParaRPr>
           </a:p>
           <a:p>
             <a:pPr lvl="1"/>
@@ -5366,17 +5341,7 @@
                 <a:latin typeface="微軟正黑體" panose="020B0604030504040204" pitchFamily="34" charset="-120"/>
                 <a:ea typeface="微軟正黑體" panose="020B0604030504040204" pitchFamily="34" charset="-120"/>
               </a:rPr>
-              <a:t>may be  due to statistical bias</a:t>
-            </a:r>
-            <a:r>
-              <a:rPr lang="en-US" altLang="zh-TW" sz="2800" dirty="0" smtClean="0">
-                <a:solidFill>
-                  <a:srgbClr val="00B0F0"/>
-                </a:solidFill>
-                <a:latin typeface="微軟正黑體" panose="020B0604030504040204" pitchFamily="34" charset="-120"/>
-                <a:ea typeface="微軟正黑體" panose="020B0604030504040204" pitchFamily="34" charset="-120"/>
-              </a:rPr>
-              <a:t>.</a:t>
+              <a:t>may be  due to statistical bias.</a:t>
             </a:r>
             <a:r>
               <a:rPr lang="zh-TW" altLang="en-US" sz="2800" dirty="0" smtClean="0">
@@ -5480,7 +5445,7 @@
           <p:cNvPr id="6" name="Rectangle 19">
             <a:extLst>
               <a:ext uri="{FF2B5EF4-FFF2-40B4-BE49-F238E27FC236}">
-                <a16:creationId xmlns:a16="http://schemas.microsoft.com/office/drawing/2014/main" xmlns="" id="{0364B90F-DC6A-447C-9B45-4BC7335B0D8E}"/>
+                <a16:creationId xmlns="" xmlns:a16="http://schemas.microsoft.com/office/drawing/2014/main" id="{0364B90F-DC6A-447C-9B45-4BC7335B0D8E}"/>
               </a:ext>
             </a:extLst>
           </p:cNvPr>
@@ -5707,13 +5672,6 @@
               </a:rPr>
               <a:t>models may be another good choice .</a:t>
             </a:r>
-            <a:endParaRPr lang="en-US" altLang="zh-TW" sz="3200" dirty="0" smtClean="0">
-              <a:solidFill>
-                <a:srgbClr val="002060"/>
-              </a:solidFill>
-              <a:latin typeface="微軟正黑體" panose="020B0604030504040204" pitchFamily="34" charset="-120"/>
-              <a:ea typeface="微軟正黑體" panose="020B0604030504040204" pitchFamily="34" charset="-120"/>
-            </a:endParaRPr>
           </a:p>
           <a:p>
             <a:pPr marL="457200" lvl="1" indent="0">
@@ -7254,7 +7212,7 @@
           <p:cNvPr id="10" name="箭號: 向右 19">
             <a:extLst>
               <a:ext uri="{FF2B5EF4-FFF2-40B4-BE49-F238E27FC236}">
-                <a16:creationId xmlns:a16="http://schemas.microsoft.com/office/drawing/2014/main" xmlns="" id="{7D240800-D004-DD09-BD56-AFD4DFCB37C8}"/>
+                <a16:creationId xmlns="" xmlns:a16="http://schemas.microsoft.com/office/drawing/2014/main" id="{7D240800-D004-DD09-BD56-AFD4DFCB37C8}"/>
               </a:ext>
             </a:extLst>
           </p:cNvPr>
@@ -7620,6 +7578,600 @@
           <a:lstStyle/>
           <a:p>
             <a:r>
+              <a:rPr lang="en-US" altLang="zh-TW" sz="4000" b="1" dirty="0" err="1">
+                <a:solidFill>
+                  <a:schemeClr val="bg2">
+                    <a:lumMod val="50000"/>
+                  </a:schemeClr>
+                </a:solidFill>
+                <a:latin typeface="微軟正黑體" panose="020B0604030504040204" pitchFamily="34" charset="-120"/>
+                <a:ea typeface="微軟正黑體" panose="020B0604030504040204" pitchFamily="34" charset="-120"/>
+              </a:rPr>
+              <a:t>r</a:t>
+            </a:r>
+            <a:r>
+              <a:rPr lang="en-US" altLang="zh-TW" sz="4000" b="1" dirty="0" err="1" smtClean="0">
+                <a:solidFill>
+                  <a:schemeClr val="bg2">
+                    <a:lumMod val="50000"/>
+                  </a:schemeClr>
+                </a:solidFill>
+                <a:latin typeface="微軟正黑體" panose="020B0604030504040204" pitchFamily="34" charset="-120"/>
+                <a:ea typeface="微軟正黑體" panose="020B0604030504040204" pitchFamily="34" charset="-120"/>
+              </a:rPr>
+              <a:t>miner</a:t>
+            </a:r>
+            <a:r>
+              <a:rPr lang="en-US" altLang="zh-TW" sz="4000" b="1" dirty="0" smtClean="0">
+                <a:solidFill>
+                  <a:schemeClr val="bg2">
+                    <a:lumMod val="50000"/>
+                  </a:schemeClr>
+                </a:solidFill>
+                <a:latin typeface="微軟正黑體" panose="020B0604030504040204" pitchFamily="34" charset="-120"/>
+                <a:ea typeface="微軟正黑體" panose="020B0604030504040204" pitchFamily="34" charset="-120"/>
+              </a:rPr>
+              <a:t> is the best </a:t>
+            </a:r>
+            <a:r>
+              <a:rPr lang="en-US" altLang="zh-TW" sz="4000" b="1" dirty="0" err="1" smtClean="0">
+                <a:solidFill>
+                  <a:schemeClr val="bg2">
+                    <a:lumMod val="50000"/>
+                  </a:schemeClr>
+                </a:solidFill>
+                <a:latin typeface="微軟正黑體" panose="020B0604030504040204" pitchFamily="34" charset="-120"/>
+                <a:ea typeface="微軟正黑體" panose="020B0604030504040204" pitchFamily="34" charset="-120"/>
+              </a:rPr>
+              <a:t>AutoML</a:t>
+            </a:r>
+            <a:r>
+              <a:rPr lang="en-US" altLang="zh-TW" sz="4000" b="1" dirty="0" smtClean="0">
+                <a:solidFill>
+                  <a:schemeClr val="bg2">
+                    <a:lumMod val="50000"/>
+                  </a:schemeClr>
+                </a:solidFill>
+                <a:latin typeface="微軟正黑體" panose="020B0604030504040204" pitchFamily="34" charset="-120"/>
+                <a:ea typeface="微軟正黑體" panose="020B0604030504040204" pitchFamily="34" charset="-120"/>
+              </a:rPr>
+              <a:t> tool?</a:t>
+            </a:r>
+            <a:endParaRPr lang="zh-TW" altLang="en-US" sz="4000" b="1" dirty="0">
+              <a:solidFill>
+                <a:schemeClr val="bg2">
+                  <a:lumMod val="50000"/>
+                </a:schemeClr>
+              </a:solidFill>
+              <a:latin typeface="微軟正黑體" panose="020B0604030504040204" pitchFamily="34" charset="-120"/>
+              <a:ea typeface="微軟正黑體" panose="020B0604030504040204" pitchFamily="34" charset="-120"/>
+            </a:endParaRPr>
+          </a:p>
+        </p:txBody>
+      </p:sp>
+      <p:sp>
+        <p:nvSpPr>
+          <p:cNvPr id="3" name="內容版面配置區 2"/>
+          <p:cNvSpPr>
+            <a:spLocks noGrp="1"/>
+          </p:cNvSpPr>
+          <p:nvPr>
+            <p:ph idx="1"/>
+          </p:nvPr>
+        </p:nvSpPr>
+        <p:spPr>
+          <a:xfrm>
+            <a:off x="529389" y="1259634"/>
+            <a:ext cx="11454064" cy="3817692"/>
+          </a:xfrm>
+        </p:spPr>
+        <p:txBody>
+          <a:bodyPr>
+            <a:normAutofit/>
+          </a:bodyPr>
+          <a:lstStyle/>
+          <a:p>
+            <a:r>
+              <a:rPr lang="en-US" altLang="zh-TW" sz="3200" dirty="0" smtClean="0">
+                <a:solidFill>
+                  <a:srgbClr val="002060"/>
+                </a:solidFill>
+                <a:latin typeface="微軟正黑體" panose="020B0604030504040204" pitchFamily="34" charset="-120"/>
+                <a:ea typeface="微軟正黑體" panose="020B0604030504040204" pitchFamily="34" charset="-120"/>
+              </a:rPr>
+              <a:t>For multi-class task:</a:t>
+            </a:r>
+          </a:p>
+          <a:p>
+            <a:pPr lvl="1"/>
+            <a:r>
+              <a:rPr lang="en-US" altLang="zh-TW" sz="2400" dirty="0" err="1" smtClean="0">
+                <a:solidFill>
+                  <a:srgbClr val="00B0F0"/>
+                </a:solidFill>
+                <a:latin typeface="微軟正黑體" panose="020B0604030504040204" pitchFamily="34" charset="-120"/>
+                <a:ea typeface="微軟正黑體" panose="020B0604030504040204" pitchFamily="34" charset="-120"/>
+              </a:rPr>
+              <a:t>AutoGluon</a:t>
+            </a:r>
+            <a:r>
+              <a:rPr lang="en-US" altLang="zh-TW" sz="2400" dirty="0" smtClean="0">
+                <a:solidFill>
+                  <a:srgbClr val="00B0F0"/>
+                </a:solidFill>
+                <a:latin typeface="微軟正黑體" panose="020B0604030504040204" pitchFamily="34" charset="-120"/>
+                <a:ea typeface="微軟正黑體" panose="020B0604030504040204" pitchFamily="34" charset="-120"/>
+              </a:rPr>
+              <a:t> </a:t>
+            </a:r>
+            <a:r>
+              <a:rPr lang="en-US" altLang="zh-TW" dirty="0" smtClean="0">
+                <a:solidFill>
+                  <a:srgbClr val="00B0F0"/>
+                </a:solidFill>
+                <a:latin typeface="微軟正黑體" panose="020B0604030504040204" pitchFamily="34" charset="-120"/>
+                <a:ea typeface="微軟正黑體" panose="020B0604030504040204" pitchFamily="34" charset="-120"/>
+              </a:rPr>
+              <a:t>have the best one.</a:t>
+            </a:r>
+          </a:p>
+          <a:p>
+            <a:pPr lvl="1"/>
+            <a:r>
+              <a:rPr lang="en-US" altLang="zh-TW" dirty="0" smtClean="0">
+                <a:solidFill>
+                  <a:srgbClr val="00B0F0"/>
+                </a:solidFill>
+                <a:latin typeface="微軟正黑體" panose="020B0604030504040204" pitchFamily="34" charset="-120"/>
+                <a:ea typeface="微軟正黑體" panose="020B0604030504040204" pitchFamily="34" charset="-120"/>
+              </a:rPr>
+              <a:t>2</a:t>
+            </a:r>
+            <a:r>
+              <a:rPr lang="en-US" altLang="zh-TW" baseline="30000" dirty="0" smtClean="0">
+                <a:solidFill>
+                  <a:srgbClr val="00B0F0"/>
+                </a:solidFill>
+                <a:latin typeface="微軟正黑體" panose="020B0604030504040204" pitchFamily="34" charset="-120"/>
+                <a:ea typeface="微軟正黑體" panose="020B0604030504040204" pitchFamily="34" charset="-120"/>
+              </a:rPr>
+              <a:t>nd</a:t>
+            </a:r>
+            <a:r>
+              <a:rPr lang="en-US" altLang="zh-TW" dirty="0" smtClean="0">
+                <a:solidFill>
+                  <a:srgbClr val="00B0F0"/>
+                </a:solidFill>
+                <a:latin typeface="微軟正黑體" panose="020B0604030504040204" pitchFamily="34" charset="-120"/>
+                <a:ea typeface="微軟正黑體" panose="020B0604030504040204" pitchFamily="34" charset="-120"/>
+              </a:rPr>
+              <a:t> one are Auto-</a:t>
+            </a:r>
+            <a:r>
+              <a:rPr lang="en-US" altLang="zh-TW" dirty="0" err="1" smtClean="0">
+                <a:solidFill>
+                  <a:srgbClr val="00B0F0"/>
+                </a:solidFill>
+                <a:latin typeface="微軟正黑體" panose="020B0604030504040204" pitchFamily="34" charset="-120"/>
+                <a:ea typeface="微軟正黑體" panose="020B0604030504040204" pitchFamily="34" charset="-120"/>
+              </a:rPr>
+              <a:t>Sklean</a:t>
+            </a:r>
+            <a:r>
+              <a:rPr lang="en-US" altLang="zh-TW" dirty="0" smtClean="0">
+                <a:solidFill>
+                  <a:srgbClr val="00B0F0"/>
+                </a:solidFill>
+                <a:latin typeface="微軟正黑體" panose="020B0604030504040204" pitchFamily="34" charset="-120"/>
+                <a:ea typeface="微軟正黑體" panose="020B0604030504040204" pitchFamily="34" charset="-120"/>
+              </a:rPr>
+              <a:t>, H2O and TPOT</a:t>
+            </a:r>
+            <a:r>
+              <a:rPr lang="en-US" altLang="zh-TW" dirty="0" smtClean="0">
+                <a:solidFill>
+                  <a:srgbClr val="00B0F0"/>
+                </a:solidFill>
+                <a:latin typeface="微軟正黑體" panose="020B0604030504040204" pitchFamily="34" charset="-120"/>
+                <a:ea typeface="微軟正黑體" panose="020B0604030504040204" pitchFamily="34" charset="-120"/>
+              </a:rPr>
+              <a:t> </a:t>
+            </a:r>
+          </a:p>
+          <a:p>
+            <a:pPr lvl="1"/>
+            <a:r>
+              <a:rPr lang="en-US" altLang="zh-TW" dirty="0" smtClean="0">
+                <a:solidFill>
+                  <a:srgbClr val="00B0F0"/>
+                </a:solidFill>
+                <a:latin typeface="微軟正黑體" panose="020B0604030504040204" pitchFamily="34" charset="-120"/>
+                <a:ea typeface="微軟正黑體" panose="020B0604030504040204" pitchFamily="34" charset="-120"/>
+              </a:rPr>
+              <a:t>f</a:t>
+            </a:r>
+            <a:r>
+              <a:rPr lang="en-US" altLang="zh-TW" sz="2400" dirty="0" smtClean="0">
+                <a:solidFill>
+                  <a:srgbClr val="00B0F0"/>
+                </a:solidFill>
+                <a:latin typeface="微軟正黑體" panose="020B0604030504040204" pitchFamily="34" charset="-120"/>
+                <a:ea typeface="微軟正黑體" panose="020B0604030504040204" pitchFamily="34" charset="-120"/>
+              </a:rPr>
+              <a:t>inally: </a:t>
+            </a:r>
+            <a:r>
+              <a:rPr lang="en-US" altLang="zh-TW" sz="2400" dirty="0" err="1" smtClean="0">
+                <a:solidFill>
+                  <a:srgbClr val="00B0F0"/>
+                </a:solidFill>
+                <a:latin typeface="微軟正黑體" panose="020B0604030504040204" pitchFamily="34" charset="-120"/>
+                <a:ea typeface="微軟正黑體" panose="020B0604030504040204" pitchFamily="34" charset="-120"/>
+              </a:rPr>
+              <a:t>rminer</a:t>
+            </a:r>
+            <a:r>
+              <a:rPr lang="en-US" altLang="zh-TW" sz="2400" dirty="0" smtClean="0">
+                <a:solidFill>
+                  <a:srgbClr val="00B0F0"/>
+                </a:solidFill>
+                <a:latin typeface="微軟正黑體" panose="020B0604030504040204" pitchFamily="34" charset="-120"/>
+                <a:ea typeface="微軟正黑體" panose="020B0604030504040204" pitchFamily="34" charset="-120"/>
+              </a:rPr>
+              <a:t> </a:t>
+            </a:r>
+            <a:endParaRPr lang="zh-TW" altLang="en-US" sz="2400" dirty="0" smtClean="0">
+              <a:solidFill>
+                <a:srgbClr val="00B0F0"/>
+              </a:solidFill>
+              <a:latin typeface="微軟正黑體" panose="020B0604030504040204" pitchFamily="34" charset="-120"/>
+              <a:ea typeface="微軟正黑體" panose="020B0604030504040204" pitchFamily="34" charset="-120"/>
+            </a:endParaRPr>
+          </a:p>
+          <a:p>
+            <a:r>
+              <a:rPr lang="en-US" altLang="zh-TW" sz="3200" dirty="0" err="1">
+                <a:solidFill>
+                  <a:srgbClr val="002060"/>
+                </a:solidFill>
+                <a:latin typeface="微軟正黑體" panose="020B0604030504040204" pitchFamily="34" charset="-120"/>
+                <a:ea typeface="微軟正黑體" panose="020B0604030504040204" pitchFamily="34" charset="-120"/>
+              </a:rPr>
+              <a:t>r</a:t>
+            </a:r>
+            <a:r>
+              <a:rPr lang="en-US" altLang="zh-TW" sz="3200" dirty="0" err="1" smtClean="0">
+                <a:solidFill>
+                  <a:srgbClr val="002060"/>
+                </a:solidFill>
+                <a:latin typeface="微軟正黑體" panose="020B0604030504040204" pitchFamily="34" charset="-120"/>
+                <a:ea typeface="微軟正黑體" panose="020B0604030504040204" pitchFamily="34" charset="-120"/>
+              </a:rPr>
+              <a:t>miner</a:t>
+            </a:r>
+            <a:r>
+              <a:rPr lang="en-US" altLang="zh-TW" sz="3200" dirty="0" smtClean="0">
+                <a:solidFill>
+                  <a:srgbClr val="002060"/>
+                </a:solidFill>
+                <a:latin typeface="微軟正黑體" panose="020B0604030504040204" pitchFamily="34" charset="-120"/>
+                <a:ea typeface="微軟正黑體" panose="020B0604030504040204" pitchFamily="34" charset="-120"/>
+              </a:rPr>
+              <a:t> have an advantage in regression task.	</a:t>
+            </a:r>
+            <a:endParaRPr lang="en-US" altLang="zh-TW" sz="3200" dirty="0" smtClean="0">
+              <a:solidFill>
+                <a:srgbClr val="002060"/>
+              </a:solidFill>
+              <a:latin typeface="微軟正黑體" panose="020B0604030504040204" pitchFamily="34" charset="-120"/>
+              <a:ea typeface="微軟正黑體" panose="020B0604030504040204" pitchFamily="34" charset="-120"/>
+            </a:endParaRPr>
+          </a:p>
+        </p:txBody>
+      </p:sp>
+      <p:sp>
+        <p:nvSpPr>
+          <p:cNvPr id="4" name="矩形 3"/>
+          <p:cNvSpPr/>
+          <p:nvPr/>
+        </p:nvSpPr>
+        <p:spPr>
+          <a:xfrm>
+            <a:off x="5977217" y="3244334"/>
+            <a:ext cx="237566" cy="369332"/>
+          </a:xfrm>
+          <a:prstGeom prst="rect">
+            <a:avLst/>
+          </a:prstGeom>
+        </p:spPr>
+        <p:txBody>
+          <a:bodyPr wrap="none">
+            <a:spAutoFit/>
+          </a:bodyPr>
+          <a:lstStyle/>
+          <a:p>
+            <a:r>
+              <a:rPr lang="zh-TW" altLang="en-US" dirty="0"/>
+              <a:t> </a:t>
+            </a:r>
+          </a:p>
+        </p:txBody>
+      </p:sp>
+      <p:sp>
+        <p:nvSpPr>
+          <p:cNvPr id="5" name="矩形 4"/>
+          <p:cNvSpPr/>
+          <p:nvPr/>
+        </p:nvSpPr>
+        <p:spPr>
+          <a:xfrm>
+            <a:off x="5977217" y="3244334"/>
+            <a:ext cx="237566" cy="369332"/>
+          </a:xfrm>
+          <a:prstGeom prst="rect">
+            <a:avLst/>
+          </a:prstGeom>
+        </p:spPr>
+        <p:txBody>
+          <a:bodyPr wrap="none">
+            <a:spAutoFit/>
+          </a:bodyPr>
+          <a:lstStyle/>
+          <a:p>
+            <a:r>
+              <a:rPr lang="zh-TW" altLang="en-US" dirty="0"/>
+              <a:t> </a:t>
+            </a:r>
+          </a:p>
+        </p:txBody>
+      </p:sp>
+      <p:sp>
+        <p:nvSpPr>
+          <p:cNvPr id="6" name="Rectangle 19">
+            <a:extLst>
+              <a:ext uri="{FF2B5EF4-FFF2-40B4-BE49-F238E27FC236}">
+                <a16:creationId xmlns="" xmlns:a16="http://schemas.microsoft.com/office/drawing/2014/main" id="{6454D6FC-C350-0CE4-A924-71B16B72A8FD}"/>
+              </a:ext>
+            </a:extLst>
+          </p:cNvPr>
+          <p:cNvSpPr>
+            <a:spLocks noChangeArrowheads="1"/>
+          </p:cNvSpPr>
+          <p:nvPr/>
+        </p:nvSpPr>
+        <p:spPr bwMode="gray">
+          <a:xfrm>
+            <a:off x="0" y="6273225"/>
+            <a:ext cx="11353800" cy="584775"/>
+          </a:xfrm>
+          <a:prstGeom prst="rect">
+            <a:avLst/>
+          </a:prstGeom>
+          <a:noFill/>
+          <a:ln>
+            <a:noFill/>
+          </a:ln>
+          <a:effectLst/>
+          <a:extLst>
+            <a:ext uri="{909E8E84-426E-40DD-AFC4-6F175D3DCCD1}">
+              <a14:hiddenFill xmlns:a14="http://schemas.microsoft.com/office/drawing/2010/main">
+                <a:solidFill>
+                  <a:schemeClr val="accent1"/>
+                </a:solidFill>
+              </a14:hiddenFill>
+            </a:ext>
+            <a:ext uri="{91240B29-F687-4F45-9708-019B960494DF}">
+              <a14:hiddenLine xmlns:a14="http://schemas.microsoft.com/office/drawing/2010/main" w="9525" algn="ctr">
+                <a:solidFill>
+                  <a:schemeClr val="tx1"/>
+                </a:solidFill>
+                <a:miter lim="800000"/>
+                <a:headEnd/>
+                <a:tailEnd/>
+              </a14:hiddenLine>
+            </a:ext>
+            <a:ext uri="{AF507438-7753-43E0-B8FC-AC1667EBCBE1}">
+              <a14:hiddenEffects xmlns:a14="http://schemas.microsoft.com/office/drawing/2010/main">
+                <a:effectLst>
+                  <a:outerShdw dist="35921" dir="2700000" algn="ctr" rotWithShape="0">
+                    <a:schemeClr val="bg2"/>
+                  </a:outerShdw>
+                </a:effectLst>
+              </a14:hiddenEffects>
+            </a:ext>
+          </a:extLst>
+        </p:spPr>
+        <p:txBody>
+          <a:bodyPr wrap="square">
+            <a:spAutoFit/>
+          </a:bodyPr>
+          <a:lstStyle/>
+          <a:p>
+            <a:pPr eaLnBrk="0" hangingPunct="0"/>
+            <a:r>
+              <a:rPr lang="en-US" altLang="zh-TW" sz="1600" dirty="0">
+                <a:solidFill>
+                  <a:srgbClr val="FF0000"/>
+                </a:solidFill>
+                <a:latin typeface="Times New Roman" panose="02020603050405020304" pitchFamily="18" charset="0"/>
+                <a:ea typeface="微軟正黑體" panose="020B0604030504040204" pitchFamily="34" charset="-120"/>
+                <a:cs typeface="Times New Roman" panose="02020603050405020304" pitchFamily="18" charset="0"/>
+              </a:rPr>
+              <a:t>Source: </a:t>
+            </a:r>
+            <a:r>
+              <a:rPr lang="en-US" altLang="zh-TW" sz="1600" dirty="0">
+                <a:solidFill>
+                  <a:srgbClr val="FF0000"/>
+                </a:solidFill>
+                <a:latin typeface="Times New Roman" panose="02020603050405020304" pitchFamily="18" charset="0"/>
+                <a:ea typeface="微軟正黑體" panose="020B0604030504040204" pitchFamily="34" charset="-120"/>
+                <a:cs typeface="Times New Roman" panose="02020603050405020304" pitchFamily="18" charset="0"/>
+              </a:rPr>
+              <a:t>Ferreira, L., et al. A comparison of </a:t>
+            </a:r>
+            <a:r>
+              <a:rPr lang="en-US" altLang="zh-TW" sz="1600" dirty="0" err="1">
+                <a:solidFill>
+                  <a:srgbClr val="FF0000"/>
+                </a:solidFill>
+                <a:latin typeface="Times New Roman" panose="02020603050405020304" pitchFamily="18" charset="0"/>
+                <a:ea typeface="微軟正黑體" panose="020B0604030504040204" pitchFamily="34" charset="-120"/>
+                <a:cs typeface="Times New Roman" panose="02020603050405020304" pitchFamily="18" charset="0"/>
+              </a:rPr>
+              <a:t>AutoML</a:t>
+            </a:r>
+            <a:r>
+              <a:rPr lang="en-US" altLang="zh-TW" sz="1600" dirty="0">
+                <a:solidFill>
+                  <a:srgbClr val="FF0000"/>
+                </a:solidFill>
+                <a:latin typeface="Times New Roman" panose="02020603050405020304" pitchFamily="18" charset="0"/>
+                <a:ea typeface="微軟正黑體" panose="020B0604030504040204" pitchFamily="34" charset="-120"/>
+                <a:cs typeface="Times New Roman" panose="02020603050405020304" pitchFamily="18" charset="0"/>
+              </a:rPr>
+              <a:t> tools for machine learning, deep learning and </a:t>
+            </a:r>
+            <a:r>
+              <a:rPr lang="en-US" altLang="zh-TW" sz="1600" dirty="0" err="1">
+                <a:solidFill>
+                  <a:srgbClr val="FF0000"/>
+                </a:solidFill>
+                <a:latin typeface="Times New Roman" panose="02020603050405020304" pitchFamily="18" charset="0"/>
+                <a:ea typeface="微軟正黑體" panose="020B0604030504040204" pitchFamily="34" charset="-120"/>
+                <a:cs typeface="Times New Roman" panose="02020603050405020304" pitchFamily="18" charset="0"/>
+              </a:rPr>
+              <a:t>XGBoost</a:t>
+            </a:r>
+            <a:r>
+              <a:rPr lang="en-US" altLang="zh-TW" sz="1600" dirty="0">
+                <a:solidFill>
+                  <a:srgbClr val="FF0000"/>
+                </a:solidFill>
+                <a:latin typeface="Times New Roman" panose="02020603050405020304" pitchFamily="18" charset="0"/>
+                <a:ea typeface="微軟正黑體" panose="020B0604030504040204" pitchFamily="34" charset="-120"/>
+                <a:cs typeface="Times New Roman" panose="02020603050405020304" pitchFamily="18" charset="0"/>
+              </a:rPr>
+              <a:t>. in 2021 International Joint Conference on Neural Networks (IJCNN). 2021. IEEE</a:t>
+            </a:r>
+            <a:endParaRPr lang="en-US" altLang="zh-TW" sz="1600" b="1" dirty="0">
+              <a:solidFill>
+                <a:srgbClr val="0070C0"/>
+              </a:solidFill>
+              <a:latin typeface="Times New Roman" panose="02020603050405020304" pitchFamily="18" charset="0"/>
+              <a:ea typeface="微軟正黑體" panose="020B0604030504040204" pitchFamily="34" charset="-120"/>
+              <a:cs typeface="Times New Roman" panose="02020603050405020304" pitchFamily="18" charset="0"/>
+            </a:endParaRPr>
+          </a:p>
+        </p:txBody>
+      </p:sp>
+      <p:pic>
+        <p:nvPicPr>
+          <p:cNvPr id="7" name="圖片 6"/>
+          <p:cNvPicPr>
+            <a:picLocks noChangeAspect="1"/>
+          </p:cNvPicPr>
+          <p:nvPr/>
+        </p:nvPicPr>
+        <p:blipFill>
+          <a:blip r:embed="rId2"/>
+          <a:stretch>
+            <a:fillRect/>
+          </a:stretch>
+        </p:blipFill>
+        <p:spPr>
+          <a:xfrm>
+            <a:off x="5517315" y="4674513"/>
+            <a:ext cx="6466138" cy="550309"/>
+          </a:xfrm>
+          <a:prstGeom prst="rect">
+            <a:avLst/>
+          </a:prstGeom>
+        </p:spPr>
+      </p:pic>
+      <p:pic>
+        <p:nvPicPr>
+          <p:cNvPr id="8" name="圖片 7"/>
+          <p:cNvPicPr>
+            <a:picLocks noChangeAspect="1"/>
+          </p:cNvPicPr>
+          <p:nvPr/>
+        </p:nvPicPr>
+        <p:blipFill>
+          <a:blip r:embed="rId3">
+            <a:extLst>
+              <a:ext uri="{28A0092B-C50C-407E-A947-70E740481C1C}">
+                <a14:useLocalDpi xmlns:a14="http://schemas.microsoft.com/office/drawing/2010/main" val="0"/>
+              </a:ext>
+            </a:extLst>
+          </a:blip>
+          <a:stretch>
+            <a:fillRect/>
+          </a:stretch>
+        </p:blipFill>
+        <p:spPr>
+          <a:xfrm>
+            <a:off x="720635" y="4234338"/>
+            <a:ext cx="4239217" cy="1514686"/>
+          </a:xfrm>
+          <a:prstGeom prst="rect">
+            <a:avLst/>
+          </a:prstGeom>
+        </p:spPr>
+      </p:pic>
+    </p:spTree>
+    <p:extLst>
+      <p:ext uri="{BB962C8B-B14F-4D97-AF65-F5344CB8AC3E}">
+        <p14:creationId xmlns:p14="http://schemas.microsoft.com/office/powerpoint/2010/main" val="2122972267"/>
+      </p:ext>
+    </p:extLst>
+  </p:cSld>
+  <p:clrMapOvr>
+    <a:masterClrMapping/>
+  </p:clrMapOvr>
+</p:sld>
+</file>
+
+<file path=ppt/slides/slide18.xml><?xml version="1.0" encoding="utf-8"?>
+<p:sld xmlns:a="http://schemas.openxmlformats.org/drawingml/2006/main" xmlns:r="http://schemas.openxmlformats.org/officeDocument/2006/relationships" xmlns:p="http://schemas.openxmlformats.org/presentationml/2006/main">
+  <p:cSld>
+    <p:spTree>
+      <p:nvGrpSpPr>
+        <p:cNvPr id="1" name=""/>
+        <p:cNvGrpSpPr/>
+        <p:nvPr/>
+      </p:nvGrpSpPr>
+      <p:grpSpPr>
+        <a:xfrm>
+          <a:off x="0" y="0"/>
+          <a:ext cx="0" cy="0"/>
+          <a:chOff x="0" y="0"/>
+          <a:chExt cx="0" cy="0"/>
+        </a:xfrm>
+      </p:grpSpPr>
+      <p:sp>
+        <p:nvSpPr>
+          <p:cNvPr id="2" name="標題 1"/>
+          <p:cNvSpPr>
+            <a:spLocks noGrp="1"/>
+          </p:cNvSpPr>
+          <p:nvPr>
+            <p:ph type="title"/>
+          </p:nvPr>
+        </p:nvSpPr>
+        <p:spPr>
+          <a:xfrm>
+            <a:off x="838200" y="271820"/>
+            <a:ext cx="10515600" cy="838524"/>
+          </a:xfrm>
+        </p:spPr>
+        <p:txBody>
+          <a:bodyPr>
+            <a:normAutofit/>
+          </a:bodyPr>
+          <a:lstStyle/>
+          <a:p>
+            <a:r>
               <a:rPr lang="en-US" altLang="zh-TW" sz="4000" b="1" dirty="0">
                 <a:solidFill>
                   <a:schemeClr val="bg2">
@@ -7988,7 +8540,7 @@
 </p:sld>
 </file>
 
-<file path=ppt/slides/slide18.xml><?xml version="1.0" encoding="utf-8"?>
+<file path=ppt/slides/slide19.xml><?xml version="1.0" encoding="utf-8"?>
 <p:sld xmlns:a="http://schemas.openxmlformats.org/drawingml/2006/main" xmlns:r="http://schemas.openxmlformats.org/officeDocument/2006/relationships" xmlns:p="http://schemas.openxmlformats.org/presentationml/2006/main">
   <p:cSld>
     <p:bg>
@@ -8018,7 +8570,7 @@
           <p:cNvPr id="5" name="圖片 4" descr="一張含有 貓, 哺乳類, 家貓, 靠近 的圖片&#10;&#10;自動產生的描述">
             <a:extLst>
               <a:ext uri="{FF2B5EF4-FFF2-40B4-BE49-F238E27FC236}">
-                <a16:creationId xmlns:a16="http://schemas.microsoft.com/office/drawing/2014/main" xmlns="" id="{84C98B85-DDDB-4E47-A3DF-652580697E4C}"/>
+                <a16:creationId xmlns="" xmlns:a16="http://schemas.microsoft.com/office/drawing/2014/main" id="{84C98B85-DDDB-4E47-A3DF-652580697E4C}"/>
               </a:ext>
             </a:extLst>
           </p:cNvPr>
@@ -8432,7 +8984,7 @@
           <p:cNvPr id="7" name="群組 6">
             <a:extLst>
               <a:ext uri="{FF2B5EF4-FFF2-40B4-BE49-F238E27FC236}">
-                <a16:creationId xmlns:a16="http://schemas.microsoft.com/office/drawing/2014/main" xmlns="" id="{4879FE05-459D-43AB-95CC-22A02C184ECC}"/>
+                <a16:creationId xmlns="" xmlns:a16="http://schemas.microsoft.com/office/drawing/2014/main" id="{4879FE05-459D-43AB-95CC-22A02C184ECC}"/>
               </a:ext>
             </a:extLst>
           </p:cNvPr>
@@ -8847,7 +9399,7 @@
           <p:cNvPr id="6" name="群組 5">
             <a:extLst>
               <a:ext uri="{FF2B5EF4-FFF2-40B4-BE49-F238E27FC236}">
-                <a16:creationId xmlns:a16="http://schemas.microsoft.com/office/drawing/2014/main" xmlns="" id="{4FA5F03B-5A92-4535-BF0F-8A2900017917}"/>
+                <a16:creationId xmlns="" xmlns:a16="http://schemas.microsoft.com/office/drawing/2014/main" id="{4FA5F03B-5A92-4535-BF0F-8A2900017917}"/>
               </a:ext>
             </a:extLst>
           </p:cNvPr>
@@ -9159,7 +9711,7 @@
           <p:cNvPr id="27" name="Text Box 20">
             <a:extLst>
               <a:ext uri="{FF2B5EF4-FFF2-40B4-BE49-F238E27FC236}">
-                <a16:creationId xmlns:a16="http://schemas.microsoft.com/office/drawing/2014/main" xmlns="" id="{F9312277-1DAE-418C-9D54-80BEB7A72A86}"/>
+                <a16:creationId xmlns="" xmlns:a16="http://schemas.microsoft.com/office/drawing/2014/main" id="{F9312277-1DAE-418C-9D54-80BEB7A72A86}"/>
               </a:ext>
             </a:extLst>
           </p:cNvPr>
@@ -9342,13 +9894,7 @@
               <a:rPr lang="en-US" altLang="zh-TW" sz="3600" dirty="0" smtClean="0">
                 <a:ea typeface="標楷體" panose="03000509000000000000" pitchFamily="65" charset="-120"/>
               </a:rPr>
-              <a:t>Our </a:t>
-            </a:r>
-            <a:r>
-              <a:rPr lang="en-US" altLang="zh-TW" sz="3600" dirty="0" smtClean="0">
-                <a:ea typeface="標楷體" panose="03000509000000000000" pitchFamily="65" charset="-120"/>
-              </a:rPr>
-              <a:t>results</a:t>
+              <a:t>Our results</a:t>
             </a:r>
             <a:endParaRPr lang="zh-TW" altLang="en-US" sz="3600" dirty="0">
               <a:ea typeface="標楷體" panose="03000509000000000000" pitchFamily="65" charset="-120"/>
@@ -9361,7 +9907,7 @@
           <p:cNvPr id="8" name="群組 7">
             <a:extLst>
               <a:ext uri="{FF2B5EF4-FFF2-40B4-BE49-F238E27FC236}">
-                <a16:creationId xmlns:a16="http://schemas.microsoft.com/office/drawing/2014/main" xmlns="" id="{A6D8C35F-D02D-4C2C-8A88-B1338CB11A4D}"/>
+                <a16:creationId xmlns="" xmlns:a16="http://schemas.microsoft.com/office/drawing/2014/main" id="{A6D8C35F-D02D-4C2C-8A88-B1338CB11A4D}"/>
               </a:ext>
             </a:extLst>
           </p:cNvPr>
@@ -10010,7 +10556,7 @@
           <p:cNvPr id="6" name="Rectangle 19">
             <a:extLst>
               <a:ext uri="{FF2B5EF4-FFF2-40B4-BE49-F238E27FC236}">
-                <a16:creationId xmlns:a16="http://schemas.microsoft.com/office/drawing/2014/main" xmlns="" id="{06228A8D-960E-F761-CE20-EE12710EAC39}"/>
+                <a16:creationId xmlns="" xmlns:a16="http://schemas.microsoft.com/office/drawing/2014/main" id="{06228A8D-960E-F761-CE20-EE12710EAC39}"/>
               </a:ext>
             </a:extLst>
           </p:cNvPr>
@@ -10090,7 +10636,7 @@
           <p:cNvPr id="7" name="箭號: 向右 19">
             <a:extLst>
               <a:ext uri="{FF2B5EF4-FFF2-40B4-BE49-F238E27FC236}">
-                <a16:creationId xmlns:a16="http://schemas.microsoft.com/office/drawing/2014/main" xmlns="" id="{7D240800-D004-DD09-BD56-AFD4DFCB37C8}"/>
+                <a16:creationId xmlns="" xmlns:a16="http://schemas.microsoft.com/office/drawing/2014/main" id="{7D240800-D004-DD09-BD56-AFD4DFCB37C8}"/>
               </a:ext>
             </a:extLst>
           </p:cNvPr>
@@ -10204,7 +10750,7 @@
           <p:cNvPr id="5" name="標題 1">
             <a:extLst>
               <a:ext uri="{FF2B5EF4-FFF2-40B4-BE49-F238E27FC236}">
-                <a16:creationId xmlns:a16="http://schemas.microsoft.com/office/drawing/2014/main" xmlns="" id="{2EECD845-6E4E-4334-BE7E-660A135106AB}"/>
+                <a16:creationId xmlns="" xmlns:a16="http://schemas.microsoft.com/office/drawing/2014/main" id="{2EECD845-6E4E-4334-BE7E-660A135106AB}"/>
               </a:ext>
             </a:extLst>
           </p:cNvPr>
@@ -10587,7 +11133,7 @@
           <p:cNvPr id="7" name="圖片 6">
             <a:extLst>
               <a:ext uri="{FF2B5EF4-FFF2-40B4-BE49-F238E27FC236}">
-                <a16:creationId xmlns:a16="http://schemas.microsoft.com/office/drawing/2014/main" xmlns="" id="{7D3935CA-3809-1659-2FA5-259277C6606E}"/>
+                <a16:creationId xmlns="" xmlns:a16="http://schemas.microsoft.com/office/drawing/2014/main" id="{7D3935CA-3809-1659-2FA5-259277C6606E}"/>
               </a:ext>
             </a:extLst>
           </p:cNvPr>
@@ -10623,7 +11169,7 @@
           <p:cNvPr id="8" name="標題 1">
             <a:extLst>
               <a:ext uri="{FF2B5EF4-FFF2-40B4-BE49-F238E27FC236}">
-                <a16:creationId xmlns:a16="http://schemas.microsoft.com/office/drawing/2014/main" xmlns="" id="{9EC7C4DC-EA2B-B3F0-8D57-661F9D560C41}"/>
+                <a16:creationId xmlns="" xmlns:a16="http://schemas.microsoft.com/office/drawing/2014/main" id="{9EC7C4DC-EA2B-B3F0-8D57-661F9D560C41}"/>
               </a:ext>
             </a:extLst>
           </p:cNvPr>
@@ -10896,17 +11442,7 @@
                 <a:latin typeface="微軟正黑體" panose="020B0604030504040204" pitchFamily="34" charset="-120"/>
                 <a:ea typeface="微軟正黑體" panose="020B0604030504040204" pitchFamily="34" charset="-120"/>
               </a:rPr>
-              <a:t>models, </a:t>
-            </a:r>
-            <a:r>
-              <a:rPr lang="en-US" altLang="zh-TW" sz="3200" dirty="0" smtClean="0">
-                <a:solidFill>
-                  <a:srgbClr val="002060"/>
-                </a:solidFill>
-                <a:latin typeface="微軟正黑體" panose="020B0604030504040204" pitchFamily="34" charset="-120"/>
-                <a:ea typeface="微軟正黑體" panose="020B0604030504040204" pitchFamily="34" charset="-120"/>
-              </a:rPr>
-              <a:t>such as  </a:t>
+              <a:t>models, such as  </a:t>
             </a:r>
             <a:r>
               <a:rPr lang="en-US" altLang="zh-TW" sz="3200" dirty="0" err="1" smtClean="0">
@@ -11233,7 +11769,7 @@
           <p:cNvPr id="9" name="圖片 8">
             <a:extLst>
               <a:ext uri="{FF2B5EF4-FFF2-40B4-BE49-F238E27FC236}">
-                <a16:creationId xmlns:a16="http://schemas.microsoft.com/office/drawing/2014/main" xmlns="" id="{FC067DAD-BBAE-4FE4-B250-707EE7DEB61F}"/>
+                <a16:creationId xmlns="" xmlns:a16="http://schemas.microsoft.com/office/drawing/2014/main" id="{FC067DAD-BBAE-4FE4-B250-707EE7DEB61F}"/>
               </a:ext>
             </a:extLst>
           </p:cNvPr>
@@ -11263,7 +11799,7 @@
           <p:cNvPr id="15" name="矩形 14">
             <a:extLst>
               <a:ext uri="{FF2B5EF4-FFF2-40B4-BE49-F238E27FC236}">
-                <a16:creationId xmlns:a16="http://schemas.microsoft.com/office/drawing/2014/main" xmlns="" id="{6B6F2237-6F7A-4C59-BC6C-BF0875344D0C}"/>
+                <a16:creationId xmlns="" xmlns:a16="http://schemas.microsoft.com/office/drawing/2014/main" id="{6B6F2237-6F7A-4C59-BC6C-BF0875344D0C}"/>
               </a:ext>
             </a:extLst>
           </p:cNvPr>
@@ -11316,7 +11852,7 @@
           <p:cNvPr id="6" name="標題 1">
             <a:extLst>
               <a:ext uri="{FF2B5EF4-FFF2-40B4-BE49-F238E27FC236}">
-                <a16:creationId xmlns:a16="http://schemas.microsoft.com/office/drawing/2014/main" xmlns="" id="{2EECD845-6E4E-4334-BE7E-660A135106AB}"/>
+                <a16:creationId xmlns="" xmlns:a16="http://schemas.microsoft.com/office/drawing/2014/main" id="{2EECD845-6E4E-4334-BE7E-660A135106AB}"/>
               </a:ext>
             </a:extLst>
           </p:cNvPr>
@@ -11416,7 +11952,7 @@
           <p:cNvPr id="11" name="圖片 10">
             <a:extLst>
               <a:ext uri="{FF2B5EF4-FFF2-40B4-BE49-F238E27FC236}">
-                <a16:creationId xmlns:a16="http://schemas.microsoft.com/office/drawing/2014/main" xmlns="" id="{74D3E3F3-0AC0-4704-A5FF-E75EC6BDF3ED}"/>
+                <a16:creationId xmlns="" xmlns:a16="http://schemas.microsoft.com/office/drawing/2014/main" id="{74D3E3F3-0AC0-4704-A5FF-E75EC6BDF3ED}"/>
               </a:ext>
             </a:extLst>
           </p:cNvPr>
@@ -11446,7 +11982,7 @@
           <p:cNvPr id="13" name="直線接點 12">
             <a:extLst>
               <a:ext uri="{FF2B5EF4-FFF2-40B4-BE49-F238E27FC236}">
-                <a16:creationId xmlns:a16="http://schemas.microsoft.com/office/drawing/2014/main" xmlns="" id="{C1C12E10-7D51-40C6-895E-C9364FF54153}"/>
+                <a16:creationId xmlns="" xmlns:a16="http://schemas.microsoft.com/office/drawing/2014/main" id="{C1C12E10-7D51-40C6-895E-C9364FF54153}"/>
               </a:ext>
             </a:extLst>
           </p:cNvPr>
@@ -11485,7 +12021,7 @@
           <p:cNvPr id="14" name="矩形 13">
             <a:extLst>
               <a:ext uri="{FF2B5EF4-FFF2-40B4-BE49-F238E27FC236}">
-                <a16:creationId xmlns:a16="http://schemas.microsoft.com/office/drawing/2014/main" xmlns="" id="{64603E9D-7E12-42AD-B485-007E0F4D01AF}"/>
+                <a16:creationId xmlns="" xmlns:a16="http://schemas.microsoft.com/office/drawing/2014/main" id="{64603E9D-7E12-42AD-B485-007E0F4D01AF}"/>
               </a:ext>
             </a:extLst>
           </p:cNvPr>
@@ -11538,7 +12074,7 @@
           <p:cNvPr id="16" name="Rectangle 19">
             <a:extLst>
               <a:ext uri="{FF2B5EF4-FFF2-40B4-BE49-F238E27FC236}">
-                <a16:creationId xmlns:a16="http://schemas.microsoft.com/office/drawing/2014/main" xmlns="" id="{B2263B31-FEEC-4F92-8412-C145B1DA50BB}"/>
+                <a16:creationId xmlns="" xmlns:a16="http://schemas.microsoft.com/office/drawing/2014/main" id="{B2263B31-FEEC-4F92-8412-C145B1DA50BB}"/>
               </a:ext>
             </a:extLst>
           </p:cNvPr>
@@ -11625,7 +12161,7 @@
           <p:cNvPr id="17" name="Rectangle 19">
             <a:extLst>
               <a:ext uri="{FF2B5EF4-FFF2-40B4-BE49-F238E27FC236}">
-                <a16:creationId xmlns:a16="http://schemas.microsoft.com/office/drawing/2014/main" xmlns="" id="{0364B90F-DC6A-447C-9B45-4BC7335B0D8E}"/>
+                <a16:creationId xmlns="" xmlns:a16="http://schemas.microsoft.com/office/drawing/2014/main" id="{0364B90F-DC6A-447C-9B45-4BC7335B0D8E}"/>
               </a:ext>
             </a:extLst>
           </p:cNvPr>

</xml_diff>